<commit_message>
Full draft of defense presentation
</commit_message>
<xml_diff>
--- a/images/BlockDiagrams.pptx
+++ b/images/BlockDiagrams.pptx
@@ -160,7 +160,7 @@
             </a:lvl1pPr>
           </a:lstStyle>
           <a:p>
-            <a:endParaRPr lang="en-US"/>
+            <a:endParaRPr lang="en-US" dirty="0"/>
           </a:p>
         </p:txBody>
       </p:sp>
@@ -195,7 +195,7 @@
               <a:rPr lang="en-US" smtClean="0"/>
               <a:t>4/10/2016</a:t>
             </a:fld>
-            <a:endParaRPr lang="en-US"/>
+            <a:endParaRPr lang="en-US" dirty="0"/>
           </a:p>
         </p:txBody>
       </p:sp>
@@ -228,7 +228,7 @@
           <a:bodyPr vert="horz" lIns="91440" tIns="45720" rIns="91440" bIns="45720" rtlCol="0" anchor="ctr"/>
           <a:lstStyle/>
           <a:p>
-            <a:endParaRPr lang="en-US"/>
+            <a:endParaRPr lang="en-US" dirty="0"/>
           </a:p>
         </p:txBody>
       </p:sp>
@@ -319,7 +319,7 @@
             </a:lvl1pPr>
           </a:lstStyle>
           <a:p>
-            <a:endParaRPr lang="en-US"/>
+            <a:endParaRPr lang="en-US" dirty="0"/>
           </a:p>
         </p:txBody>
       </p:sp>
@@ -354,7 +354,7 @@
               <a:rPr lang="en-US" smtClean="0"/>
               <a:t>‹#›</a:t>
             </a:fld>
-            <a:endParaRPr lang="en-US"/>
+            <a:endParaRPr lang="en-US" dirty="0"/>
           </a:p>
         </p:txBody>
       </p:sp>
@@ -644,7 +644,7 @@
               <a:rPr lang="en-US" smtClean="0"/>
               <a:t>4/10/2016</a:t>
             </a:fld>
-            <a:endParaRPr lang="en-US"/>
+            <a:endParaRPr lang="en-US" dirty="0"/>
           </a:p>
         </p:txBody>
       </p:sp>
@@ -663,7 +663,7 @@
           <a:bodyPr/>
           <a:lstStyle/>
           <a:p>
-            <a:endParaRPr lang="en-US"/>
+            <a:endParaRPr lang="en-US" dirty="0"/>
           </a:p>
         </p:txBody>
       </p:sp>
@@ -686,7 +686,7 @@
               <a:rPr lang="en-US" smtClean="0"/>
               <a:t>‹#›</a:t>
             </a:fld>
-            <a:endParaRPr lang="en-US"/>
+            <a:endParaRPr lang="en-US" dirty="0"/>
           </a:p>
         </p:txBody>
       </p:sp>
@@ -814,7 +814,7 @@
               <a:rPr lang="en-US" smtClean="0"/>
               <a:t>4/10/2016</a:t>
             </a:fld>
-            <a:endParaRPr lang="en-US"/>
+            <a:endParaRPr lang="en-US" dirty="0"/>
           </a:p>
         </p:txBody>
       </p:sp>
@@ -833,7 +833,7 @@
           <a:bodyPr/>
           <a:lstStyle/>
           <a:p>
-            <a:endParaRPr lang="en-US"/>
+            <a:endParaRPr lang="en-US" dirty="0"/>
           </a:p>
         </p:txBody>
       </p:sp>
@@ -856,7 +856,7 @@
               <a:rPr lang="en-US" smtClean="0"/>
               <a:t>‹#›</a:t>
             </a:fld>
-            <a:endParaRPr lang="en-US"/>
+            <a:endParaRPr lang="en-US" dirty="0"/>
           </a:p>
         </p:txBody>
       </p:sp>
@@ -994,7 +994,7 @@
               <a:rPr lang="en-US" smtClean="0"/>
               <a:t>4/10/2016</a:t>
             </a:fld>
-            <a:endParaRPr lang="en-US"/>
+            <a:endParaRPr lang="en-US" dirty="0"/>
           </a:p>
         </p:txBody>
       </p:sp>
@@ -1013,7 +1013,7 @@
           <a:bodyPr/>
           <a:lstStyle/>
           <a:p>
-            <a:endParaRPr lang="en-US"/>
+            <a:endParaRPr lang="en-US" dirty="0"/>
           </a:p>
         </p:txBody>
       </p:sp>
@@ -1036,7 +1036,7 @@
               <a:rPr lang="en-US" smtClean="0"/>
               <a:t>‹#›</a:t>
             </a:fld>
-            <a:endParaRPr lang="en-US"/>
+            <a:endParaRPr lang="en-US" dirty="0"/>
           </a:p>
         </p:txBody>
       </p:sp>
@@ -1164,7 +1164,7 @@
               <a:rPr lang="en-US" smtClean="0"/>
               <a:t>4/10/2016</a:t>
             </a:fld>
-            <a:endParaRPr lang="en-US"/>
+            <a:endParaRPr lang="en-US" dirty="0"/>
           </a:p>
         </p:txBody>
       </p:sp>
@@ -1183,7 +1183,7 @@
           <a:bodyPr/>
           <a:lstStyle/>
           <a:p>
-            <a:endParaRPr lang="en-US"/>
+            <a:endParaRPr lang="en-US" dirty="0"/>
           </a:p>
         </p:txBody>
       </p:sp>
@@ -1206,7 +1206,7 @@
               <a:rPr lang="en-US" smtClean="0"/>
               <a:t>‹#›</a:t>
             </a:fld>
-            <a:endParaRPr lang="en-US"/>
+            <a:endParaRPr lang="en-US" dirty="0"/>
           </a:p>
         </p:txBody>
       </p:sp>
@@ -1410,7 +1410,7 @@
               <a:rPr lang="en-US" smtClean="0"/>
               <a:t>4/10/2016</a:t>
             </a:fld>
-            <a:endParaRPr lang="en-US"/>
+            <a:endParaRPr lang="en-US" dirty="0"/>
           </a:p>
         </p:txBody>
       </p:sp>
@@ -1429,7 +1429,7 @@
           <a:bodyPr/>
           <a:lstStyle/>
           <a:p>
-            <a:endParaRPr lang="en-US"/>
+            <a:endParaRPr lang="en-US" dirty="0"/>
           </a:p>
         </p:txBody>
       </p:sp>
@@ -1452,7 +1452,7 @@
               <a:rPr lang="en-US" smtClean="0"/>
               <a:t>‹#›</a:t>
             </a:fld>
-            <a:endParaRPr lang="en-US"/>
+            <a:endParaRPr lang="en-US" dirty="0"/>
           </a:p>
         </p:txBody>
       </p:sp>
@@ -1698,7 +1698,7 @@
               <a:rPr lang="en-US" smtClean="0"/>
               <a:t>4/10/2016</a:t>
             </a:fld>
-            <a:endParaRPr lang="en-US"/>
+            <a:endParaRPr lang="en-US" dirty="0"/>
           </a:p>
         </p:txBody>
       </p:sp>
@@ -1717,7 +1717,7 @@
           <a:bodyPr/>
           <a:lstStyle/>
           <a:p>
-            <a:endParaRPr lang="en-US"/>
+            <a:endParaRPr lang="en-US" dirty="0"/>
           </a:p>
         </p:txBody>
       </p:sp>
@@ -1740,7 +1740,7 @@
               <a:rPr lang="en-US" smtClean="0"/>
               <a:t>‹#›</a:t>
             </a:fld>
-            <a:endParaRPr lang="en-US"/>
+            <a:endParaRPr lang="en-US" dirty="0"/>
           </a:p>
         </p:txBody>
       </p:sp>
@@ -2120,7 +2120,7 @@
               <a:rPr lang="en-US" smtClean="0"/>
               <a:t>4/10/2016</a:t>
             </a:fld>
-            <a:endParaRPr lang="en-US"/>
+            <a:endParaRPr lang="en-US" dirty="0"/>
           </a:p>
         </p:txBody>
       </p:sp>
@@ -2139,7 +2139,7 @@
           <a:bodyPr/>
           <a:lstStyle/>
           <a:p>
-            <a:endParaRPr lang="en-US"/>
+            <a:endParaRPr lang="en-US" dirty="0"/>
           </a:p>
         </p:txBody>
       </p:sp>
@@ -2162,7 +2162,7 @@
               <a:rPr lang="en-US" smtClean="0"/>
               <a:t>‹#›</a:t>
             </a:fld>
-            <a:endParaRPr lang="en-US"/>
+            <a:endParaRPr lang="en-US" dirty="0"/>
           </a:p>
         </p:txBody>
       </p:sp>
@@ -2238,7 +2238,7 @@
               <a:rPr lang="en-US" smtClean="0"/>
               <a:t>4/10/2016</a:t>
             </a:fld>
-            <a:endParaRPr lang="en-US"/>
+            <a:endParaRPr lang="en-US" dirty="0"/>
           </a:p>
         </p:txBody>
       </p:sp>
@@ -2257,7 +2257,7 @@
           <a:bodyPr/>
           <a:lstStyle/>
           <a:p>
-            <a:endParaRPr lang="en-US"/>
+            <a:endParaRPr lang="en-US" dirty="0"/>
           </a:p>
         </p:txBody>
       </p:sp>
@@ -2280,7 +2280,7 @@
               <a:rPr lang="en-US" smtClean="0"/>
               <a:t>‹#›</a:t>
             </a:fld>
-            <a:endParaRPr lang="en-US"/>
+            <a:endParaRPr lang="en-US" dirty="0"/>
           </a:p>
         </p:txBody>
       </p:sp>
@@ -2333,7 +2333,7 @@
               <a:rPr lang="en-US" smtClean="0"/>
               <a:t>4/10/2016</a:t>
             </a:fld>
-            <a:endParaRPr lang="en-US"/>
+            <a:endParaRPr lang="en-US" dirty="0"/>
           </a:p>
         </p:txBody>
       </p:sp>
@@ -2352,7 +2352,7 @@
           <a:bodyPr/>
           <a:lstStyle/>
           <a:p>
-            <a:endParaRPr lang="en-US"/>
+            <a:endParaRPr lang="en-US" dirty="0"/>
           </a:p>
         </p:txBody>
       </p:sp>
@@ -2375,7 +2375,7 @@
               <a:rPr lang="en-US" smtClean="0"/>
               <a:t>‹#›</a:t>
             </a:fld>
-            <a:endParaRPr lang="en-US"/>
+            <a:endParaRPr lang="en-US" dirty="0"/>
           </a:p>
         </p:txBody>
       </p:sp>
@@ -2610,7 +2610,7 @@
               <a:rPr lang="en-US" smtClean="0"/>
               <a:t>4/10/2016</a:t>
             </a:fld>
-            <a:endParaRPr lang="en-US"/>
+            <a:endParaRPr lang="en-US" dirty="0"/>
           </a:p>
         </p:txBody>
       </p:sp>
@@ -2629,7 +2629,7 @@
           <a:bodyPr/>
           <a:lstStyle/>
           <a:p>
-            <a:endParaRPr lang="en-US"/>
+            <a:endParaRPr lang="en-US" dirty="0"/>
           </a:p>
         </p:txBody>
       </p:sp>
@@ -2652,7 +2652,7 @@
               <a:rPr lang="en-US" smtClean="0"/>
               <a:t>‹#›</a:t>
             </a:fld>
-            <a:endParaRPr lang="en-US"/>
+            <a:endParaRPr lang="en-US" dirty="0"/>
           </a:p>
         </p:txBody>
       </p:sp>
@@ -2775,7 +2775,7 @@
             </a:lvl9pPr>
           </a:lstStyle>
           <a:p>
-            <a:endParaRPr lang="en-US"/>
+            <a:endParaRPr lang="en-US" dirty="0"/>
           </a:p>
         </p:txBody>
       </p:sp>
@@ -2863,7 +2863,7 @@
               <a:rPr lang="en-US" smtClean="0"/>
               <a:t>4/10/2016</a:t>
             </a:fld>
-            <a:endParaRPr lang="en-US"/>
+            <a:endParaRPr lang="en-US" dirty="0"/>
           </a:p>
         </p:txBody>
       </p:sp>
@@ -2882,7 +2882,7 @@
           <a:bodyPr/>
           <a:lstStyle/>
           <a:p>
-            <a:endParaRPr lang="en-US"/>
+            <a:endParaRPr lang="en-US" dirty="0"/>
           </a:p>
         </p:txBody>
       </p:sp>
@@ -2905,7 +2905,7 @@
               <a:rPr lang="en-US" smtClean="0"/>
               <a:t>‹#›</a:t>
             </a:fld>
-            <a:endParaRPr lang="en-US"/>
+            <a:endParaRPr lang="en-US" dirty="0"/>
           </a:p>
         </p:txBody>
       </p:sp>
@@ -3076,7 +3076,7 @@
               <a:rPr lang="en-US" smtClean="0"/>
               <a:t>4/10/2016</a:t>
             </a:fld>
-            <a:endParaRPr lang="en-US"/>
+            <a:endParaRPr lang="en-US" dirty="0"/>
           </a:p>
         </p:txBody>
       </p:sp>
@@ -3113,7 +3113,7 @@
             </a:lvl1pPr>
           </a:lstStyle>
           <a:p>
-            <a:endParaRPr lang="en-US"/>
+            <a:endParaRPr lang="en-US" dirty="0"/>
           </a:p>
         </p:txBody>
       </p:sp>
@@ -3154,7 +3154,7 @@
               <a:rPr lang="en-US" smtClean="0"/>
               <a:t>‹#›</a:t>
             </a:fld>
-            <a:endParaRPr lang="en-US"/>
+            <a:endParaRPr lang="en-US" dirty="0"/>
           </a:p>
         </p:txBody>
       </p:sp>
@@ -3711,7 +3711,7 @@
           <a:lstStyle/>
           <a:p>
             <a:pPr algn="ctr"/>
-            <a:endParaRPr lang="en-US"/>
+            <a:endParaRPr lang="en-US" dirty="0"/>
           </a:p>
         </p:txBody>
       </p:sp>
@@ -3750,7 +3750,7 @@
           <a:lstStyle/>
           <a:p>
             <a:pPr algn="ctr"/>
-            <a:endParaRPr lang="en-US"/>
+            <a:endParaRPr lang="en-US" dirty="0"/>
           </a:p>
         </p:txBody>
       </p:sp>
@@ -4021,7 +4021,7 @@
           <a:lstStyle/>
           <a:p>
             <a:pPr algn="ctr"/>
-            <a:endParaRPr lang="en-US"/>
+            <a:endParaRPr lang="en-US" dirty="0"/>
           </a:p>
         </p:txBody>
       </p:sp>
@@ -4060,7 +4060,7 @@
           <a:lstStyle/>
           <a:p>
             <a:pPr algn="ctr"/>
-            <a:endParaRPr lang="en-US"/>
+            <a:endParaRPr lang="en-US" dirty="0"/>
           </a:p>
         </p:txBody>
       </p:sp>
@@ -4286,7 +4286,7 @@
           <a:lstStyle/>
           <a:p>
             <a:pPr algn="ctr"/>
-            <a:endParaRPr lang="en-US"/>
+            <a:endParaRPr lang="en-US" dirty="0"/>
           </a:p>
         </p:txBody>
       </p:sp>
@@ -4460,7 +4460,7 @@
           <a:lstStyle/>
           <a:p>
             <a:pPr algn="ctr"/>
-            <a:endParaRPr lang="en-US"/>
+            <a:endParaRPr lang="en-US" dirty="0"/>
           </a:p>
         </p:txBody>
       </p:sp>
@@ -4849,7 +4849,7 @@
           <a:lstStyle/>
           <a:p>
             <a:pPr algn="ctr"/>
-            <a:endParaRPr lang="en-US"/>
+            <a:endParaRPr lang="en-US" dirty="0"/>
           </a:p>
         </p:txBody>
       </p:sp>
@@ -5023,7 +5023,7 @@
           <a:lstStyle/>
           <a:p>
             <a:pPr algn="ctr"/>
-            <a:endParaRPr lang="en-US"/>
+            <a:endParaRPr lang="en-US" dirty="0"/>
           </a:p>
         </p:txBody>
       </p:sp>
@@ -5232,7 +5232,7 @@
           <a:lstStyle/>
           <a:p>
             <a:pPr algn="ctr"/>
-            <a:endParaRPr lang="en-US"/>
+            <a:endParaRPr lang="en-US" dirty="0"/>
           </a:p>
         </p:txBody>
       </p:sp>
@@ -5317,7 +5317,7 @@
           <a:lstStyle/>
           <a:p>
             <a:pPr algn="ctr"/>
-            <a:endParaRPr lang="en-US"/>
+            <a:endParaRPr lang="en-US" dirty="0"/>
           </a:p>
         </p:txBody>
       </p:sp>
@@ -5464,8 +5464,8 @@
           <a:chExt cx="0" cy="0"/>
         </a:xfrm>
       </p:grpSpPr>
-      <mc:AlternateContent xmlns:mc="http://schemas.openxmlformats.org/markup-compatibility/2006">
-        <mc:Choice xmlns:a14="http://schemas.microsoft.com/office/drawing/2010/main" Requires="a14">
+      <mc:AlternateContent xmlns:mc="http://schemas.openxmlformats.org/markup-compatibility/2006" xmlns:a14="http://schemas.microsoft.com/office/drawing/2010/main">
+        <mc:Choice Requires="a14">
           <p:sp>
             <p:nvSpPr>
               <p:cNvPr id="4" name="TextBox 3"/>
@@ -5515,7 +5515,7 @@
             </p:txBody>
           </p:sp>
         </mc:Choice>
-        <mc:Fallback>
+        <mc:Fallback xmlns="">
           <p:sp>
             <p:nvSpPr>
               <p:cNvPr id="4" name="TextBox 3"/>
@@ -5622,45 +5622,12 @@
           <a:lstStyle/>
           <a:p>
             <a:pPr algn="ctr"/>
-            <a:endParaRPr lang="en-US"/>
-          </a:p>
-        </p:txBody>
-      </p:sp>
-      <p:cxnSp>
-        <p:nvCxnSpPr>
-          <p:cNvPr id="10" name="Straight Arrow Connector 9"/>
-          <p:cNvCxnSpPr/>
-          <p:nvPr/>
-        </p:nvCxnSpPr>
-        <p:spPr>
-          <a:xfrm>
-            <a:off x="5486400" y="1523304"/>
-            <a:ext cx="1040073" cy="0"/>
-          </a:xfrm>
-          <a:prstGeom prst="straightConnector1">
-            <a:avLst/>
-          </a:prstGeom>
-          <a:ln>
-            <a:tailEnd type="arrow"/>
-          </a:ln>
-        </p:spPr>
-        <p:style>
-          <a:lnRef idx="2">
-            <a:schemeClr val="dk1"/>
-          </a:lnRef>
-          <a:fillRef idx="0">
-            <a:schemeClr val="dk1"/>
-          </a:fillRef>
-          <a:effectRef idx="1">
-            <a:schemeClr val="dk1"/>
-          </a:effectRef>
-          <a:fontRef idx="minor">
-            <a:schemeClr val="tx1"/>
-          </a:fontRef>
-        </p:style>
-      </p:cxnSp>
-      <mc:AlternateContent xmlns:mc="http://schemas.openxmlformats.org/markup-compatibility/2006">
-        <mc:Choice xmlns:a14="http://schemas.microsoft.com/office/drawing/2010/main" Requires="a14">
+            <a:endParaRPr lang="en-US" dirty="0"/>
+          </a:p>
+        </p:txBody>
+      </p:sp>
+      <mc:AlternateContent xmlns:mc="http://schemas.openxmlformats.org/markup-compatibility/2006" xmlns:a14="http://schemas.microsoft.com/office/drawing/2010/main">
+        <mc:Choice Requires="a14">
           <p:sp>
             <p:nvSpPr>
               <p:cNvPr id="13" name="TextBox 12"/>
@@ -5735,7 +5702,7 @@
             </p:txBody>
           </p:sp>
         </mc:Choice>
-        <mc:Fallback>
+        <mc:Fallback xmlns="">
           <p:sp>
             <p:nvSpPr>
               <p:cNvPr id="13" name="TextBox 12"/>
@@ -5818,7 +5785,7 @@
           <a:lstStyle/>
           <a:p>
             <a:pPr algn="ctr"/>
-            <a:endParaRPr lang="en-US"/>
+            <a:endParaRPr lang="en-US" dirty="0"/>
           </a:p>
         </p:txBody>
       </p:sp>
@@ -5857,7 +5824,7 @@
           <a:lstStyle/>
           <a:p>
             <a:pPr algn="ctr"/>
-            <a:endParaRPr lang="en-US"/>
+            <a:endParaRPr lang="en-US" dirty="0"/>
           </a:p>
         </p:txBody>
       </p:sp>
@@ -6012,7 +5979,7 @@
           <a:lstStyle/>
           <a:p>
             <a:pPr algn="ctr"/>
-            <a:endParaRPr lang="en-US"/>
+            <a:endParaRPr lang="en-US" dirty="0"/>
           </a:p>
         </p:txBody>
       </p:sp>
@@ -6246,6 +6213,76 @@
           </a:fontRef>
         </p:style>
       </p:cxnSp>
+      <p:cxnSp>
+        <p:nvCxnSpPr>
+          <p:cNvPr id="11" name="Elbow Connector 10"/>
+          <p:cNvCxnSpPr>
+            <a:stCxn id="15" idx="1"/>
+            <a:endCxn id="26" idx="1"/>
+          </p:cNvCxnSpPr>
+          <p:nvPr/>
+        </p:nvCxnSpPr>
+        <p:spPr>
+          <a:xfrm rot="10800000" flipH="1">
+            <a:off x="3205889" y="1667725"/>
+            <a:ext cx="3320583" cy="11885"/>
+          </a:xfrm>
+          <a:prstGeom prst="bentConnector5">
+            <a:avLst>
+              <a:gd name="adj1" fmla="val -6884"/>
+              <a:gd name="adj2" fmla="val 6465469"/>
+              <a:gd name="adj3" fmla="val 83976"/>
+            </a:avLst>
+          </a:prstGeom>
+          <a:ln>
+            <a:tailEnd type="arrow"/>
+          </a:ln>
+        </p:spPr>
+        <p:style>
+          <a:lnRef idx="2">
+            <a:schemeClr val="dk1"/>
+          </a:lnRef>
+          <a:fillRef idx="0">
+            <a:schemeClr val="dk1"/>
+          </a:fillRef>
+          <a:effectRef idx="1">
+            <a:schemeClr val="dk1"/>
+          </a:effectRef>
+          <a:fontRef idx="minor">
+            <a:schemeClr val="tx1"/>
+          </a:fontRef>
+        </p:style>
+      </p:cxnSp>
+      <p:sp>
+        <p:nvSpPr>
+          <p:cNvPr id="37" name="TextBox 36"/>
+          <p:cNvSpPr txBox="1"/>
+          <p:nvPr/>
+        </p:nvSpPr>
+        <p:spPr>
+          <a:xfrm>
+            <a:off x="1828799" y="949441"/>
+            <a:ext cx="1377090" cy="646331"/>
+          </a:xfrm>
+          <a:prstGeom prst="rect">
+            <a:avLst/>
+          </a:prstGeom>
+          <a:noFill/>
+        </p:spPr>
+        <p:txBody>
+          <a:bodyPr wrap="square" rtlCol="0">
+            <a:spAutoFit/>
+          </a:bodyPr>
+          <a:lstStyle/>
+          <a:p>
+            <a:r>
+              <a:rPr lang="en-US" dirty="0" smtClean="0"/>
+              <a:t>Phase Detector</a:t>
+            </a:r>
+            <a:endParaRPr lang="en-US" dirty="0"/>
+          </a:p>
+        </p:txBody>
+      </p:sp>
     </p:spTree>
     <p:extLst>
       <p:ext uri="{BB962C8B-B14F-4D97-AF65-F5344CB8AC3E}">

</xml_diff>

<commit_message>
adding some scratch notes about TNCs
</commit_message>
<xml_diff>
--- a/images/BlockDiagrams.pptx
+++ b/images/BlockDiagrams.pptx
@@ -5,11 +5,13 @@
     <p:sldMasterId id="2147483648" r:id="rId1"/>
   </p:sldMasterIdLst>
   <p:notesMasterIdLst>
-    <p:notesMasterId r:id="rId4"/>
+    <p:notesMasterId r:id="rId6"/>
   </p:notesMasterIdLst>
   <p:sldIdLst>
     <p:sldId id="256" r:id="rId2"/>
     <p:sldId id="257" r:id="rId3"/>
+    <p:sldId id="258" r:id="rId4"/>
+    <p:sldId id="259" r:id="rId5"/>
   </p:sldIdLst>
   <p:sldSz cx="9144000" cy="6858000" type="screen4x3"/>
   <p:notesSz cx="6858000" cy="9144000"/>
@@ -108,6 +110,22 @@
       </a:defRPr>
     </a:lvl9pPr>
   </p:defaultTextStyle>
+  <p:extLst>
+    <p:ext uri="{EFAFB233-063F-42B5-8137-9DF3F51BA10A}">
+      <p15:sldGuideLst xmlns:p15="http://schemas.microsoft.com/office/powerpoint/2012/main">
+        <p15:guide id="1" orient="horz" pos="2160">
+          <p15:clr>
+            <a:srgbClr val="A4A3A4"/>
+          </p15:clr>
+        </p15:guide>
+        <p15:guide id="2" pos="2880">
+          <p15:clr>
+            <a:srgbClr val="A4A3A4"/>
+          </p15:clr>
+        </p15:guide>
+      </p15:sldGuideLst>
+    </p:ext>
+  </p:extLst>
 </p:presentation>
 </file>
 
@@ -193,7 +211,7 @@
           <a:p>
             <a:fld id="{05B3BC2D-CB4F-464A-895E-ADC3AD5AA8B9}" type="datetimeFigureOut">
               <a:rPr lang="en-US" smtClean="0"/>
-              <a:t>4/10/2016</a:t>
+              <a:t>6/11/2016</a:t>
             </a:fld>
             <a:endParaRPr lang="en-US" dirty="0"/>
           </a:p>
@@ -642,7 +660,7 @@
           <a:p>
             <a:fld id="{6F10FC0D-F6B1-4728-B527-09A930B8E16D}" type="datetimeFigureOut">
               <a:rPr lang="en-US" smtClean="0"/>
-              <a:t>4/10/2016</a:t>
+              <a:t>6/11/2016</a:t>
             </a:fld>
             <a:endParaRPr lang="en-US" dirty="0"/>
           </a:p>
@@ -812,7 +830,7 @@
           <a:p>
             <a:fld id="{6F10FC0D-F6B1-4728-B527-09A930B8E16D}" type="datetimeFigureOut">
               <a:rPr lang="en-US" smtClean="0"/>
-              <a:t>4/10/2016</a:t>
+              <a:t>6/11/2016</a:t>
             </a:fld>
             <a:endParaRPr lang="en-US" dirty="0"/>
           </a:p>
@@ -992,7 +1010,7 @@
           <a:p>
             <a:fld id="{6F10FC0D-F6B1-4728-B527-09A930B8E16D}" type="datetimeFigureOut">
               <a:rPr lang="en-US" smtClean="0"/>
-              <a:t>4/10/2016</a:t>
+              <a:t>6/11/2016</a:t>
             </a:fld>
             <a:endParaRPr lang="en-US" dirty="0"/>
           </a:p>
@@ -1162,7 +1180,7 @@
           <a:p>
             <a:fld id="{6F10FC0D-F6B1-4728-B527-09A930B8E16D}" type="datetimeFigureOut">
               <a:rPr lang="en-US" smtClean="0"/>
-              <a:t>4/10/2016</a:t>
+              <a:t>6/11/2016</a:t>
             </a:fld>
             <a:endParaRPr lang="en-US" dirty="0"/>
           </a:p>
@@ -1408,7 +1426,7 @@
           <a:p>
             <a:fld id="{6F10FC0D-F6B1-4728-B527-09A930B8E16D}" type="datetimeFigureOut">
               <a:rPr lang="en-US" smtClean="0"/>
-              <a:t>4/10/2016</a:t>
+              <a:t>6/11/2016</a:t>
             </a:fld>
             <a:endParaRPr lang="en-US" dirty="0"/>
           </a:p>
@@ -1696,7 +1714,7 @@
           <a:p>
             <a:fld id="{6F10FC0D-F6B1-4728-B527-09A930B8E16D}" type="datetimeFigureOut">
               <a:rPr lang="en-US" smtClean="0"/>
-              <a:t>4/10/2016</a:t>
+              <a:t>6/11/2016</a:t>
             </a:fld>
             <a:endParaRPr lang="en-US" dirty="0"/>
           </a:p>
@@ -2118,7 +2136,7 @@
           <a:p>
             <a:fld id="{6F10FC0D-F6B1-4728-B527-09A930B8E16D}" type="datetimeFigureOut">
               <a:rPr lang="en-US" smtClean="0"/>
-              <a:t>4/10/2016</a:t>
+              <a:t>6/11/2016</a:t>
             </a:fld>
             <a:endParaRPr lang="en-US" dirty="0"/>
           </a:p>
@@ -2236,7 +2254,7 @@
           <a:p>
             <a:fld id="{6F10FC0D-F6B1-4728-B527-09A930B8E16D}" type="datetimeFigureOut">
               <a:rPr lang="en-US" smtClean="0"/>
-              <a:t>4/10/2016</a:t>
+              <a:t>6/11/2016</a:t>
             </a:fld>
             <a:endParaRPr lang="en-US" dirty="0"/>
           </a:p>
@@ -2331,7 +2349,7 @@
           <a:p>
             <a:fld id="{6F10FC0D-F6B1-4728-B527-09A930B8E16D}" type="datetimeFigureOut">
               <a:rPr lang="en-US" smtClean="0"/>
-              <a:t>4/10/2016</a:t>
+              <a:t>6/11/2016</a:t>
             </a:fld>
             <a:endParaRPr lang="en-US" dirty="0"/>
           </a:p>
@@ -2608,7 +2626,7 @@
           <a:p>
             <a:fld id="{6F10FC0D-F6B1-4728-B527-09A930B8E16D}" type="datetimeFigureOut">
               <a:rPr lang="en-US" smtClean="0"/>
-              <a:t>4/10/2016</a:t>
+              <a:t>6/11/2016</a:t>
             </a:fld>
             <a:endParaRPr lang="en-US" dirty="0"/>
           </a:p>
@@ -2861,7 +2879,7 @@
           <a:p>
             <a:fld id="{6F10FC0D-F6B1-4728-B527-09A930B8E16D}" type="datetimeFigureOut">
               <a:rPr lang="en-US" smtClean="0"/>
-              <a:t>4/10/2016</a:t>
+              <a:t>6/11/2016</a:t>
             </a:fld>
             <a:endParaRPr lang="en-US" dirty="0"/>
           </a:p>
@@ -3074,7 +3092,7 @@
           <a:p>
             <a:fld id="{6F10FC0D-F6B1-4728-B527-09A930B8E16D}" type="datetimeFigureOut">
               <a:rPr lang="en-US" smtClean="0"/>
-              <a:t>4/10/2016</a:t>
+              <a:t>6/11/2016</a:t>
             </a:fld>
             <a:endParaRPr lang="en-US" dirty="0"/>
           </a:p>
@@ -3485,7 +3503,7 @@
                           <m:limLoc m:val="undOvr"/>
                           <m:ctrlPr>
                             <a:rPr lang="en-US" i="1" smtClean="0">
-                              <a:latin typeface="Cambria Math"/>
+                              <a:latin typeface="Cambria Math" panose="02040503050406030204" pitchFamily="18" charset="0"/>
                             </a:rPr>
                           </m:ctrlPr>
                         </m:naryPr>
@@ -3898,7 +3916,7 @@
                           <m:limLoc m:val="undOvr"/>
                           <m:ctrlPr>
                             <a:rPr lang="en-US" i="1" smtClean="0">
-                              <a:latin typeface="Cambria Math"/>
+                              <a:latin typeface="Cambria Math" panose="02040503050406030204" pitchFamily="18" charset="0"/>
                             </a:rPr>
                           </m:ctrlPr>
                         </m:naryPr>
@@ -5662,7 +5680,7 @@
                           <m:limLoc m:val="undOvr"/>
                           <m:ctrlPr>
                             <a:rPr lang="en-US" i="1" smtClean="0">
-                              <a:latin typeface="Cambria Math"/>
+                              <a:latin typeface="Cambria Math" panose="02040503050406030204" pitchFamily="18" charset="0"/>
                             </a:rPr>
                           </m:ctrlPr>
                         </m:naryPr>
@@ -6287,6 +6305,1138 @@
     <p:extLst>
       <p:ext uri="{BB962C8B-B14F-4D97-AF65-F5344CB8AC3E}">
         <p14:creationId xmlns:p14="http://schemas.microsoft.com/office/powerpoint/2010/main" val="2376164543"/>
+      </p:ext>
+    </p:extLst>
+  </p:cSld>
+  <p:clrMapOvr>
+    <a:masterClrMapping/>
+  </p:clrMapOvr>
+</p:sld>
+</file>
+
+<file path=ppt/slides/slide3.xml><?xml version="1.0" encoding="utf-8"?>
+<p:sld xmlns:a="http://schemas.openxmlformats.org/drawingml/2006/main" xmlns:r="http://schemas.openxmlformats.org/officeDocument/2006/relationships" xmlns:p="http://schemas.openxmlformats.org/presentationml/2006/main">
+  <p:cSld>
+    <p:spTree>
+      <p:nvGrpSpPr>
+        <p:cNvPr id="1" name=""/>
+        <p:cNvGrpSpPr/>
+        <p:nvPr/>
+      </p:nvGrpSpPr>
+      <p:grpSpPr>
+        <a:xfrm>
+          <a:off x="0" y="0"/>
+          <a:ext cx="0" cy="0"/>
+          <a:chOff x="0" y="0"/>
+          <a:chExt cx="0" cy="0"/>
+        </a:xfrm>
+      </p:grpSpPr>
+      <p:pic>
+        <p:nvPicPr>
+          <p:cNvPr id="7" name="Picture 6"/>
+          <p:cNvPicPr>
+            <a:picLocks noChangeAspect="1"/>
+          </p:cNvPicPr>
+          <p:nvPr/>
+        </p:nvPicPr>
+        <p:blipFill>
+          <a:blip r:embed="rId2" cstate="print">
+            <a:extLst>
+              <a:ext uri="{28A0092B-C50C-407E-A947-70E740481C1C}">
+                <a14:useLocalDpi xmlns:a14="http://schemas.microsoft.com/office/drawing/2010/main" val="0"/>
+              </a:ext>
+            </a:extLst>
+          </a:blip>
+          <a:stretch>
+            <a:fillRect/>
+          </a:stretch>
+        </p:blipFill>
+        <p:spPr>
+          <a:xfrm>
+            <a:off x="1978619" y="2720814"/>
+            <a:ext cx="1261570" cy="1150131"/>
+          </a:xfrm>
+          <a:prstGeom prst="rect">
+            <a:avLst/>
+          </a:prstGeom>
+        </p:spPr>
+      </p:pic>
+      <p:sp>
+        <p:nvSpPr>
+          <p:cNvPr id="8" name="TextBox 7"/>
+          <p:cNvSpPr txBox="1"/>
+          <p:nvPr/>
+        </p:nvSpPr>
+        <p:spPr>
+          <a:xfrm>
+            <a:off x="1777270" y="2172496"/>
+            <a:ext cx="1670649" cy="2246769"/>
+          </a:xfrm>
+          <a:prstGeom prst="rect">
+            <a:avLst/>
+          </a:prstGeom>
+          <a:noFill/>
+        </p:spPr>
+        <p:txBody>
+          <a:bodyPr wrap="none" rtlCol="0">
+            <a:spAutoFit/>
+          </a:bodyPr>
+          <a:lstStyle/>
+          <a:p>
+            <a:pPr algn="ctr"/>
+            <a:r>
+              <a:rPr lang="en-US" sz="2800" dirty="0" smtClean="0"/>
+              <a:t>Laptop</a:t>
+            </a:r>
+          </a:p>
+          <a:p>
+            <a:pPr algn="ctr"/>
+            <a:endParaRPr lang="en-US" sz="2800" dirty="0"/>
+          </a:p>
+          <a:p>
+            <a:pPr algn="ctr"/>
+            <a:endParaRPr lang="en-US" sz="2800" dirty="0" smtClean="0"/>
+          </a:p>
+          <a:p>
+            <a:pPr algn="ctr"/>
+            <a:endParaRPr lang="en-US" sz="2800" dirty="0" smtClean="0"/>
+          </a:p>
+          <a:p>
+            <a:pPr algn="ctr"/>
+            <a:r>
+              <a:rPr lang="en-US" sz="2800" dirty="0" smtClean="0"/>
+              <a:t>Audio Out</a:t>
+            </a:r>
+            <a:endParaRPr lang="en-US" sz="2800" dirty="0"/>
+          </a:p>
+        </p:txBody>
+      </p:sp>
+      <p:sp>
+        <p:nvSpPr>
+          <p:cNvPr id="9" name="Rectangle 8"/>
+          <p:cNvSpPr/>
+          <p:nvPr/>
+        </p:nvSpPr>
+        <p:spPr>
+          <a:xfrm>
+            <a:off x="1770889" y="2138331"/>
+            <a:ext cx="1677031" cy="2242038"/>
+          </a:xfrm>
+          <a:prstGeom prst="rect">
+            <a:avLst/>
+          </a:prstGeom>
+          <a:noFill/>
+          <a:ln w="57150">
+            <a:solidFill>
+              <a:schemeClr val="tx1"/>
+            </a:solidFill>
+          </a:ln>
+        </p:spPr>
+        <p:style>
+          <a:lnRef idx="2">
+            <a:schemeClr val="accent1">
+              <a:shade val="50000"/>
+            </a:schemeClr>
+          </a:lnRef>
+          <a:fillRef idx="1">
+            <a:schemeClr val="accent1"/>
+          </a:fillRef>
+          <a:effectRef idx="0">
+            <a:schemeClr val="accent1"/>
+          </a:effectRef>
+          <a:fontRef idx="minor">
+            <a:schemeClr val="lt1"/>
+          </a:fontRef>
+        </p:style>
+        <p:txBody>
+          <a:bodyPr rtlCol="0" anchor="ctr"/>
+          <a:lstStyle/>
+          <a:p>
+            <a:pPr algn="ctr"/>
+            <a:endParaRPr lang="en-US"/>
+          </a:p>
+        </p:txBody>
+      </p:sp>
+      <p:sp>
+        <p:nvSpPr>
+          <p:cNvPr id="10" name="TextBox 9"/>
+          <p:cNvSpPr txBox="1"/>
+          <p:nvPr/>
+        </p:nvSpPr>
+        <p:spPr>
+          <a:xfrm>
+            <a:off x="5638800" y="2133600"/>
+            <a:ext cx="1402948" cy="2246769"/>
+          </a:xfrm>
+          <a:prstGeom prst="rect">
+            <a:avLst/>
+          </a:prstGeom>
+          <a:noFill/>
+        </p:spPr>
+        <p:txBody>
+          <a:bodyPr wrap="none" rtlCol="0">
+            <a:spAutoFit/>
+          </a:bodyPr>
+          <a:lstStyle/>
+          <a:p>
+            <a:pPr algn="ctr"/>
+            <a:r>
+              <a:rPr lang="en-US" sz="2800" dirty="0" smtClean="0"/>
+              <a:t>TNC / </a:t>
+            </a:r>
+          </a:p>
+          <a:p>
+            <a:pPr algn="ctr"/>
+            <a:r>
+              <a:rPr lang="en-US" sz="2800" dirty="0" smtClean="0"/>
+              <a:t>Tracker</a:t>
+            </a:r>
+          </a:p>
+          <a:p>
+            <a:pPr algn="ctr"/>
+            <a:endParaRPr lang="en-US" sz="2800" dirty="0" smtClean="0"/>
+          </a:p>
+          <a:p>
+            <a:pPr algn="ctr"/>
+            <a:endParaRPr lang="en-US" sz="2800" dirty="0" smtClean="0"/>
+          </a:p>
+          <a:p>
+            <a:pPr algn="ctr"/>
+            <a:r>
+              <a:rPr lang="en-US" sz="2800" dirty="0" smtClean="0"/>
+              <a:t>Audio In</a:t>
+            </a:r>
+            <a:endParaRPr lang="en-US" sz="2800" dirty="0"/>
+          </a:p>
+        </p:txBody>
+      </p:sp>
+      <p:sp>
+        <p:nvSpPr>
+          <p:cNvPr id="11" name="Rectangle 10"/>
+          <p:cNvSpPr/>
+          <p:nvPr/>
+        </p:nvSpPr>
+        <p:spPr>
+          <a:xfrm>
+            <a:off x="5501759" y="2099435"/>
+            <a:ext cx="1677031" cy="2242038"/>
+          </a:xfrm>
+          <a:prstGeom prst="rect">
+            <a:avLst/>
+          </a:prstGeom>
+          <a:noFill/>
+          <a:ln w="57150">
+            <a:solidFill>
+              <a:schemeClr val="tx1"/>
+            </a:solidFill>
+          </a:ln>
+        </p:spPr>
+        <p:style>
+          <a:lnRef idx="2">
+            <a:schemeClr val="accent1">
+              <a:shade val="50000"/>
+            </a:schemeClr>
+          </a:lnRef>
+          <a:fillRef idx="1">
+            <a:schemeClr val="accent1"/>
+          </a:fillRef>
+          <a:effectRef idx="0">
+            <a:schemeClr val="accent1"/>
+          </a:effectRef>
+          <a:fontRef idx="minor">
+            <a:schemeClr val="lt1"/>
+          </a:fontRef>
+        </p:style>
+        <p:txBody>
+          <a:bodyPr rtlCol="0" anchor="ctr"/>
+          <a:lstStyle/>
+          <a:p>
+            <a:pPr algn="ctr"/>
+            <a:endParaRPr lang="en-US"/>
+          </a:p>
+        </p:txBody>
+      </p:sp>
+      <p:cxnSp>
+        <p:nvCxnSpPr>
+          <p:cNvPr id="12" name="Straight Connector 11"/>
+          <p:cNvCxnSpPr/>
+          <p:nvPr/>
+        </p:nvCxnSpPr>
+        <p:spPr>
+          <a:xfrm>
+            <a:off x="3454300" y="4178146"/>
+            <a:ext cx="2047458" cy="1863"/>
+          </a:xfrm>
+          <a:prstGeom prst="line">
+            <a:avLst/>
+          </a:prstGeom>
+          <a:ln w="57150"/>
+        </p:spPr>
+        <p:style>
+          <a:lnRef idx="1">
+            <a:schemeClr val="dk1"/>
+          </a:lnRef>
+          <a:fillRef idx="0">
+            <a:schemeClr val="dk1"/>
+          </a:fillRef>
+          <a:effectRef idx="0">
+            <a:schemeClr val="dk1"/>
+          </a:effectRef>
+          <a:fontRef idx="minor">
+            <a:schemeClr val="tx1"/>
+          </a:fontRef>
+        </p:style>
+      </p:cxnSp>
+    </p:spTree>
+    <p:extLst>
+      <p:ext uri="{BB962C8B-B14F-4D97-AF65-F5344CB8AC3E}">
+        <p14:creationId xmlns:p14="http://schemas.microsoft.com/office/powerpoint/2010/main" val="2137106197"/>
+      </p:ext>
+    </p:extLst>
+  </p:cSld>
+  <p:clrMapOvr>
+    <a:masterClrMapping/>
+  </p:clrMapOvr>
+</p:sld>
+</file>
+
+<file path=ppt/slides/slide4.xml><?xml version="1.0" encoding="utf-8"?>
+<p:sld xmlns:a="http://schemas.openxmlformats.org/drawingml/2006/main" xmlns:r="http://schemas.openxmlformats.org/officeDocument/2006/relationships" xmlns:p="http://schemas.openxmlformats.org/presentationml/2006/main">
+  <p:cSld>
+    <p:spTree>
+      <p:nvGrpSpPr>
+        <p:cNvPr id="1" name=""/>
+        <p:cNvGrpSpPr/>
+        <p:nvPr/>
+      </p:nvGrpSpPr>
+      <p:grpSpPr>
+        <a:xfrm>
+          <a:off x="0" y="0"/>
+          <a:ext cx="0" cy="0"/>
+          <a:chOff x="0" y="0"/>
+          <a:chExt cx="0" cy="0"/>
+        </a:xfrm>
+      </p:grpSpPr>
+      <p:sp>
+        <p:nvSpPr>
+          <p:cNvPr id="4" name="Isosceles Triangle 3"/>
+          <p:cNvSpPr/>
+          <p:nvPr/>
+        </p:nvSpPr>
+        <p:spPr>
+          <a:xfrm flipV="1">
+            <a:off x="2417875" y="1805354"/>
+            <a:ext cx="1362807" cy="835270"/>
+          </a:xfrm>
+          <a:prstGeom prst="triangle">
+            <a:avLst/>
+          </a:prstGeom>
+          <a:solidFill>
+            <a:schemeClr val="bg1"/>
+          </a:solidFill>
+          <a:ln w="57150">
+            <a:solidFill>
+              <a:schemeClr val="tx1"/>
+            </a:solidFill>
+          </a:ln>
+        </p:spPr>
+        <p:style>
+          <a:lnRef idx="2">
+            <a:schemeClr val="accent1">
+              <a:shade val="50000"/>
+            </a:schemeClr>
+          </a:lnRef>
+          <a:fillRef idx="1">
+            <a:schemeClr val="accent1"/>
+          </a:fillRef>
+          <a:effectRef idx="0">
+            <a:schemeClr val="accent1"/>
+          </a:effectRef>
+          <a:fontRef idx="minor">
+            <a:schemeClr val="lt1"/>
+          </a:fontRef>
+        </p:style>
+        <p:txBody>
+          <a:bodyPr rtlCol="0" anchor="ctr"/>
+          <a:lstStyle/>
+          <a:p>
+            <a:pPr algn="ctr"/>
+            <a:endParaRPr lang="en-US" sz="2800"/>
+          </a:p>
+        </p:txBody>
+      </p:sp>
+      <p:cxnSp>
+        <p:nvCxnSpPr>
+          <p:cNvPr id="5" name="Straight Connector 4"/>
+          <p:cNvCxnSpPr>
+            <a:stCxn id="4" idx="3"/>
+          </p:cNvCxnSpPr>
+          <p:nvPr/>
+        </p:nvCxnSpPr>
+        <p:spPr>
+          <a:xfrm>
+            <a:off x="3099279" y="1805354"/>
+            <a:ext cx="4396" cy="2004646"/>
+          </a:xfrm>
+          <a:prstGeom prst="line">
+            <a:avLst/>
+          </a:prstGeom>
+          <a:ln w="57150"/>
+        </p:spPr>
+        <p:style>
+          <a:lnRef idx="1">
+            <a:schemeClr val="dk1"/>
+          </a:lnRef>
+          <a:fillRef idx="0">
+            <a:schemeClr val="dk1"/>
+          </a:fillRef>
+          <a:effectRef idx="0">
+            <a:schemeClr val="dk1"/>
+          </a:effectRef>
+          <a:fontRef idx="minor">
+            <a:schemeClr val="tx1"/>
+          </a:fontRef>
+        </p:style>
+      </p:cxnSp>
+      <p:sp>
+        <p:nvSpPr>
+          <p:cNvPr id="6" name="Isosceles Triangle 5"/>
+          <p:cNvSpPr/>
+          <p:nvPr/>
+        </p:nvSpPr>
+        <p:spPr>
+          <a:xfrm flipV="1">
+            <a:off x="5269523" y="1805354"/>
+            <a:ext cx="1362807" cy="835270"/>
+          </a:xfrm>
+          <a:prstGeom prst="triangle">
+            <a:avLst/>
+          </a:prstGeom>
+          <a:solidFill>
+            <a:schemeClr val="bg1"/>
+          </a:solidFill>
+          <a:ln w="57150">
+            <a:solidFill>
+              <a:schemeClr val="tx1"/>
+            </a:solidFill>
+          </a:ln>
+        </p:spPr>
+        <p:style>
+          <a:lnRef idx="2">
+            <a:schemeClr val="accent1">
+              <a:shade val="50000"/>
+            </a:schemeClr>
+          </a:lnRef>
+          <a:fillRef idx="1">
+            <a:schemeClr val="accent1"/>
+          </a:fillRef>
+          <a:effectRef idx="0">
+            <a:schemeClr val="accent1"/>
+          </a:effectRef>
+          <a:fontRef idx="minor">
+            <a:schemeClr val="lt1"/>
+          </a:fontRef>
+        </p:style>
+        <p:txBody>
+          <a:bodyPr rtlCol="0" anchor="ctr"/>
+          <a:lstStyle/>
+          <a:p>
+            <a:pPr algn="ctr"/>
+            <a:endParaRPr lang="en-US" sz="2800"/>
+          </a:p>
+        </p:txBody>
+      </p:sp>
+      <p:cxnSp>
+        <p:nvCxnSpPr>
+          <p:cNvPr id="7" name="Straight Connector 6"/>
+          <p:cNvCxnSpPr>
+            <a:stCxn id="6" idx="3"/>
+          </p:cNvCxnSpPr>
+          <p:nvPr/>
+        </p:nvCxnSpPr>
+        <p:spPr>
+          <a:xfrm>
+            <a:off x="5950927" y="1805354"/>
+            <a:ext cx="4396" cy="2004646"/>
+          </a:xfrm>
+          <a:prstGeom prst="line">
+            <a:avLst/>
+          </a:prstGeom>
+          <a:ln w="57150"/>
+        </p:spPr>
+        <p:style>
+          <a:lnRef idx="1">
+            <a:schemeClr val="dk1"/>
+          </a:lnRef>
+          <a:fillRef idx="0">
+            <a:schemeClr val="dk1"/>
+          </a:fillRef>
+          <a:effectRef idx="0">
+            <a:schemeClr val="dk1"/>
+          </a:effectRef>
+          <a:fontRef idx="minor">
+            <a:schemeClr val="tx1"/>
+          </a:fontRef>
+        </p:style>
+      </p:cxnSp>
+      <p:sp>
+        <p:nvSpPr>
+          <p:cNvPr id="8" name="Rectangle 7"/>
+          <p:cNvSpPr/>
+          <p:nvPr/>
+        </p:nvSpPr>
+        <p:spPr>
+          <a:xfrm>
+            <a:off x="2083769" y="3810000"/>
+            <a:ext cx="1652954" cy="896816"/>
+          </a:xfrm>
+          <a:prstGeom prst="rect">
+            <a:avLst/>
+          </a:prstGeom>
+          <a:solidFill>
+            <a:schemeClr val="bg1"/>
+          </a:solidFill>
+          <a:ln w="57150">
+            <a:solidFill>
+              <a:schemeClr val="tx1"/>
+            </a:solidFill>
+          </a:ln>
+        </p:spPr>
+        <p:style>
+          <a:lnRef idx="2">
+            <a:schemeClr val="accent1">
+              <a:shade val="50000"/>
+            </a:schemeClr>
+          </a:lnRef>
+          <a:fillRef idx="1">
+            <a:schemeClr val="accent1"/>
+          </a:fillRef>
+          <a:effectRef idx="0">
+            <a:schemeClr val="accent1"/>
+          </a:effectRef>
+          <a:fontRef idx="minor">
+            <a:schemeClr val="lt1"/>
+          </a:fontRef>
+        </p:style>
+        <p:txBody>
+          <a:bodyPr rtlCol="0" anchor="ctr"/>
+          <a:lstStyle/>
+          <a:p>
+            <a:pPr algn="ctr"/>
+            <a:r>
+              <a:rPr lang="en-US" sz="2800" dirty="0" smtClean="0">
+                <a:solidFill>
+                  <a:schemeClr val="tx1"/>
+                </a:solidFill>
+              </a:rPr>
+              <a:t>TX Radio</a:t>
+            </a:r>
+            <a:endParaRPr lang="en-US" sz="2800" dirty="0">
+              <a:solidFill>
+                <a:schemeClr val="tx1"/>
+              </a:solidFill>
+            </a:endParaRPr>
+          </a:p>
+        </p:txBody>
+      </p:sp>
+      <p:sp>
+        <p:nvSpPr>
+          <p:cNvPr id="9" name="Rectangle 8"/>
+          <p:cNvSpPr/>
+          <p:nvPr/>
+        </p:nvSpPr>
+        <p:spPr>
+          <a:xfrm>
+            <a:off x="5410200" y="3810000"/>
+            <a:ext cx="1652954" cy="896816"/>
+          </a:xfrm>
+          <a:prstGeom prst="rect">
+            <a:avLst/>
+          </a:prstGeom>
+          <a:solidFill>
+            <a:schemeClr val="bg1"/>
+          </a:solidFill>
+          <a:ln w="57150">
+            <a:solidFill>
+              <a:schemeClr val="tx1"/>
+            </a:solidFill>
+          </a:ln>
+        </p:spPr>
+        <p:style>
+          <a:lnRef idx="2">
+            <a:schemeClr val="accent1">
+              <a:shade val="50000"/>
+            </a:schemeClr>
+          </a:lnRef>
+          <a:fillRef idx="1">
+            <a:schemeClr val="accent1"/>
+          </a:fillRef>
+          <a:effectRef idx="0">
+            <a:schemeClr val="accent1"/>
+          </a:effectRef>
+          <a:fontRef idx="minor">
+            <a:schemeClr val="lt1"/>
+          </a:fontRef>
+        </p:style>
+        <p:txBody>
+          <a:bodyPr rtlCol="0" anchor="ctr"/>
+          <a:lstStyle/>
+          <a:p>
+            <a:pPr algn="ctr"/>
+            <a:r>
+              <a:rPr lang="en-US" sz="2800" dirty="0">
+                <a:solidFill>
+                  <a:schemeClr val="tx1"/>
+                </a:solidFill>
+              </a:rPr>
+              <a:t>R</a:t>
+            </a:r>
+            <a:r>
+              <a:rPr lang="en-US" sz="2800" dirty="0" smtClean="0">
+                <a:solidFill>
+                  <a:schemeClr val="tx1"/>
+                </a:solidFill>
+              </a:rPr>
+              <a:t>X Radio</a:t>
+            </a:r>
+            <a:endParaRPr lang="en-US" sz="2800" dirty="0">
+              <a:solidFill>
+                <a:schemeClr val="tx1"/>
+              </a:solidFill>
+            </a:endParaRPr>
+          </a:p>
+        </p:txBody>
+      </p:sp>
+      <p:sp>
+        <p:nvSpPr>
+          <p:cNvPr id="10" name="Rectangle 9"/>
+          <p:cNvSpPr/>
+          <p:nvPr/>
+        </p:nvSpPr>
+        <p:spPr>
+          <a:xfrm>
+            <a:off x="110625" y="3810000"/>
+            <a:ext cx="1652954" cy="896816"/>
+          </a:xfrm>
+          <a:prstGeom prst="rect">
+            <a:avLst/>
+          </a:prstGeom>
+          <a:solidFill>
+            <a:schemeClr val="bg1"/>
+          </a:solidFill>
+          <a:ln w="57150">
+            <a:solidFill>
+              <a:schemeClr val="tx1"/>
+            </a:solidFill>
+          </a:ln>
+        </p:spPr>
+        <p:style>
+          <a:lnRef idx="2">
+            <a:schemeClr val="accent1">
+              <a:shade val="50000"/>
+            </a:schemeClr>
+          </a:lnRef>
+          <a:fillRef idx="1">
+            <a:schemeClr val="accent1"/>
+          </a:fillRef>
+          <a:effectRef idx="0">
+            <a:schemeClr val="accent1"/>
+          </a:effectRef>
+          <a:fontRef idx="minor">
+            <a:schemeClr val="lt1"/>
+          </a:fontRef>
+        </p:style>
+        <p:txBody>
+          <a:bodyPr rtlCol="0" anchor="ctr"/>
+          <a:lstStyle/>
+          <a:p>
+            <a:pPr algn="ctr"/>
+            <a:r>
+              <a:rPr lang="en-US" sz="2800" dirty="0" smtClean="0">
+                <a:solidFill>
+                  <a:schemeClr val="tx1"/>
+                </a:solidFill>
+              </a:rPr>
+              <a:t>APRS Tracker</a:t>
+            </a:r>
+            <a:endParaRPr lang="en-US" sz="2800" dirty="0">
+              <a:solidFill>
+                <a:schemeClr val="tx1"/>
+              </a:solidFill>
+            </a:endParaRPr>
+          </a:p>
+        </p:txBody>
+      </p:sp>
+      <p:sp>
+        <p:nvSpPr>
+          <p:cNvPr id="11" name="Rectangle 10"/>
+          <p:cNvSpPr/>
+          <p:nvPr/>
+        </p:nvSpPr>
+        <p:spPr>
+          <a:xfrm>
+            <a:off x="120151" y="2640624"/>
+            <a:ext cx="1652954" cy="896816"/>
+          </a:xfrm>
+          <a:prstGeom prst="rect">
+            <a:avLst/>
+          </a:prstGeom>
+          <a:solidFill>
+            <a:schemeClr val="bg1"/>
+          </a:solidFill>
+          <a:ln w="57150">
+            <a:solidFill>
+              <a:schemeClr val="tx1"/>
+            </a:solidFill>
+          </a:ln>
+        </p:spPr>
+        <p:style>
+          <a:lnRef idx="2">
+            <a:schemeClr val="accent1">
+              <a:shade val="50000"/>
+            </a:schemeClr>
+          </a:lnRef>
+          <a:fillRef idx="1">
+            <a:schemeClr val="accent1"/>
+          </a:fillRef>
+          <a:effectRef idx="0">
+            <a:schemeClr val="accent1"/>
+          </a:effectRef>
+          <a:fontRef idx="minor">
+            <a:schemeClr val="lt1"/>
+          </a:fontRef>
+        </p:style>
+        <p:txBody>
+          <a:bodyPr rtlCol="0" anchor="ctr"/>
+          <a:lstStyle/>
+          <a:p>
+            <a:pPr algn="ctr"/>
+            <a:r>
+              <a:rPr lang="en-US" sz="2800" dirty="0" smtClean="0">
+                <a:solidFill>
+                  <a:schemeClr val="tx1"/>
+                </a:solidFill>
+              </a:rPr>
+              <a:t>GPS</a:t>
+            </a:r>
+          </a:p>
+        </p:txBody>
+      </p:sp>
+      <p:cxnSp>
+        <p:nvCxnSpPr>
+          <p:cNvPr id="12" name="Straight Connector 11"/>
+          <p:cNvCxnSpPr>
+            <a:stCxn id="10" idx="3"/>
+            <a:endCxn id="8" idx="1"/>
+          </p:cNvCxnSpPr>
+          <p:nvPr/>
+        </p:nvCxnSpPr>
+        <p:spPr>
+          <a:xfrm>
+            <a:off x="1763579" y="4258408"/>
+            <a:ext cx="320190" cy="0"/>
+          </a:xfrm>
+          <a:prstGeom prst="line">
+            <a:avLst/>
+          </a:prstGeom>
+          <a:ln w="57150"/>
+        </p:spPr>
+        <p:style>
+          <a:lnRef idx="1">
+            <a:schemeClr val="dk1"/>
+          </a:lnRef>
+          <a:fillRef idx="0">
+            <a:schemeClr val="dk1"/>
+          </a:fillRef>
+          <a:effectRef idx="0">
+            <a:schemeClr val="dk1"/>
+          </a:effectRef>
+          <a:fontRef idx="minor">
+            <a:schemeClr val="tx1"/>
+          </a:fontRef>
+        </p:style>
+      </p:cxnSp>
+      <p:cxnSp>
+        <p:nvCxnSpPr>
+          <p:cNvPr id="13" name="Straight Connector 12"/>
+          <p:cNvCxnSpPr>
+            <a:endCxn id="10" idx="0"/>
+          </p:cNvCxnSpPr>
+          <p:nvPr/>
+        </p:nvCxnSpPr>
+        <p:spPr>
+          <a:xfrm>
+            <a:off x="929043" y="3537440"/>
+            <a:ext cx="8059" cy="272560"/>
+          </a:xfrm>
+          <a:prstGeom prst="line">
+            <a:avLst/>
+          </a:prstGeom>
+          <a:ln w="57150"/>
+        </p:spPr>
+        <p:style>
+          <a:lnRef idx="1">
+            <a:schemeClr val="dk1"/>
+          </a:lnRef>
+          <a:fillRef idx="0">
+            <a:schemeClr val="dk1"/>
+          </a:fillRef>
+          <a:effectRef idx="0">
+            <a:schemeClr val="dk1"/>
+          </a:effectRef>
+          <a:fontRef idx="minor">
+            <a:schemeClr val="tx1"/>
+          </a:fontRef>
+        </p:style>
+      </p:cxnSp>
+      <p:sp>
+        <p:nvSpPr>
+          <p:cNvPr id="14" name="Rectangle 13"/>
+          <p:cNvSpPr/>
+          <p:nvPr/>
+        </p:nvSpPr>
+        <p:spPr>
+          <a:xfrm>
+            <a:off x="7338645" y="3818792"/>
+            <a:ext cx="1652954" cy="896816"/>
+          </a:xfrm>
+          <a:prstGeom prst="rect">
+            <a:avLst/>
+          </a:prstGeom>
+          <a:solidFill>
+            <a:schemeClr val="bg1"/>
+          </a:solidFill>
+          <a:ln w="57150">
+            <a:solidFill>
+              <a:schemeClr val="tx1"/>
+            </a:solidFill>
+          </a:ln>
+        </p:spPr>
+        <p:style>
+          <a:lnRef idx="2">
+            <a:schemeClr val="accent1">
+              <a:shade val="50000"/>
+            </a:schemeClr>
+          </a:lnRef>
+          <a:fillRef idx="1">
+            <a:schemeClr val="accent1"/>
+          </a:fillRef>
+          <a:effectRef idx="0">
+            <a:schemeClr val="accent1"/>
+          </a:effectRef>
+          <a:fontRef idx="minor">
+            <a:schemeClr val="lt1"/>
+          </a:fontRef>
+        </p:style>
+        <p:txBody>
+          <a:bodyPr rtlCol="0" anchor="ctr"/>
+          <a:lstStyle/>
+          <a:p>
+            <a:pPr algn="ctr"/>
+            <a:r>
+              <a:rPr lang="en-US" sz="2800" dirty="0" smtClean="0">
+                <a:solidFill>
+                  <a:schemeClr val="tx1"/>
+                </a:solidFill>
+              </a:rPr>
+              <a:t>TNC</a:t>
+            </a:r>
+            <a:endParaRPr lang="en-US" sz="2800" dirty="0">
+              <a:solidFill>
+                <a:schemeClr val="tx1"/>
+              </a:solidFill>
+            </a:endParaRPr>
+          </a:p>
+        </p:txBody>
+      </p:sp>
+      <p:sp>
+        <p:nvSpPr>
+          <p:cNvPr id="15" name="Rectangle 14"/>
+          <p:cNvSpPr/>
+          <p:nvPr/>
+        </p:nvSpPr>
+        <p:spPr>
+          <a:xfrm>
+            <a:off x="7360626" y="2640624"/>
+            <a:ext cx="1652954" cy="896816"/>
+          </a:xfrm>
+          <a:prstGeom prst="rect">
+            <a:avLst/>
+          </a:prstGeom>
+          <a:solidFill>
+            <a:schemeClr val="bg1"/>
+          </a:solidFill>
+          <a:ln w="57150">
+            <a:solidFill>
+              <a:schemeClr val="tx1"/>
+            </a:solidFill>
+          </a:ln>
+        </p:spPr>
+        <p:style>
+          <a:lnRef idx="2">
+            <a:schemeClr val="accent1">
+              <a:shade val="50000"/>
+            </a:schemeClr>
+          </a:lnRef>
+          <a:fillRef idx="1">
+            <a:schemeClr val="accent1"/>
+          </a:fillRef>
+          <a:effectRef idx="0">
+            <a:schemeClr val="accent1"/>
+          </a:effectRef>
+          <a:fontRef idx="minor">
+            <a:schemeClr val="lt1"/>
+          </a:fontRef>
+        </p:style>
+        <p:txBody>
+          <a:bodyPr rtlCol="0" anchor="ctr"/>
+          <a:lstStyle/>
+          <a:p>
+            <a:pPr algn="ctr"/>
+            <a:r>
+              <a:rPr lang="en-US" sz="2800" dirty="0" smtClean="0">
+                <a:solidFill>
+                  <a:schemeClr val="tx1"/>
+                </a:solidFill>
+              </a:rPr>
+              <a:t>Computer</a:t>
+            </a:r>
+            <a:endParaRPr lang="en-US" sz="2800" dirty="0">
+              <a:solidFill>
+                <a:schemeClr val="tx1"/>
+              </a:solidFill>
+            </a:endParaRPr>
+          </a:p>
+        </p:txBody>
+      </p:sp>
+      <p:cxnSp>
+        <p:nvCxnSpPr>
+          <p:cNvPr id="16" name="Straight Connector 15"/>
+          <p:cNvCxnSpPr>
+            <a:stCxn id="9" idx="3"/>
+            <a:endCxn id="14" idx="1"/>
+          </p:cNvCxnSpPr>
+          <p:nvPr/>
+        </p:nvCxnSpPr>
+        <p:spPr>
+          <a:xfrm>
+            <a:off x="7063154" y="4258408"/>
+            <a:ext cx="275491" cy="8792"/>
+          </a:xfrm>
+          <a:prstGeom prst="line">
+            <a:avLst/>
+          </a:prstGeom>
+          <a:ln w="57150"/>
+        </p:spPr>
+        <p:style>
+          <a:lnRef idx="1">
+            <a:schemeClr val="dk1"/>
+          </a:lnRef>
+          <a:fillRef idx="0">
+            <a:schemeClr val="dk1"/>
+          </a:fillRef>
+          <a:effectRef idx="0">
+            <a:schemeClr val="dk1"/>
+          </a:effectRef>
+          <a:fontRef idx="minor">
+            <a:schemeClr val="tx1"/>
+          </a:fontRef>
+        </p:style>
+      </p:cxnSp>
+      <p:cxnSp>
+        <p:nvCxnSpPr>
+          <p:cNvPr id="17" name="Straight Connector 16"/>
+          <p:cNvCxnSpPr/>
+          <p:nvPr/>
+        </p:nvCxnSpPr>
+        <p:spPr>
+          <a:xfrm>
+            <a:off x="8187103" y="3511062"/>
+            <a:ext cx="8059" cy="272560"/>
+          </a:xfrm>
+          <a:prstGeom prst="line">
+            <a:avLst/>
+          </a:prstGeom>
+          <a:ln w="57150"/>
+        </p:spPr>
+        <p:style>
+          <a:lnRef idx="1">
+            <a:schemeClr val="dk1"/>
+          </a:lnRef>
+          <a:fillRef idx="0">
+            <a:schemeClr val="dk1"/>
+          </a:fillRef>
+          <a:effectRef idx="0">
+            <a:schemeClr val="dk1"/>
+          </a:effectRef>
+          <a:fontRef idx="minor">
+            <a:schemeClr val="tx1"/>
+          </a:fontRef>
+        </p:style>
+      </p:cxnSp>
+      <p:sp>
+        <p:nvSpPr>
+          <p:cNvPr id="18" name="Arc 17"/>
+          <p:cNvSpPr/>
+          <p:nvPr/>
+        </p:nvSpPr>
+        <p:spPr>
+          <a:xfrm rot="2702454">
+            <a:off x="3345994" y="1511745"/>
+            <a:ext cx="623193" cy="587215"/>
+          </a:xfrm>
+          <a:prstGeom prst="arc">
+            <a:avLst/>
+          </a:prstGeom>
+          <a:ln w="57150">
+            <a:solidFill>
+              <a:schemeClr val="tx1"/>
+            </a:solidFill>
+          </a:ln>
+        </p:spPr>
+        <p:style>
+          <a:lnRef idx="1">
+            <a:schemeClr val="accent1"/>
+          </a:lnRef>
+          <a:fillRef idx="0">
+            <a:schemeClr val="accent1"/>
+          </a:fillRef>
+          <a:effectRef idx="0">
+            <a:schemeClr val="accent1"/>
+          </a:effectRef>
+          <a:fontRef idx="minor">
+            <a:schemeClr val="tx1"/>
+          </a:fontRef>
+        </p:style>
+        <p:txBody>
+          <a:bodyPr rtlCol="0" anchor="ctr"/>
+          <a:lstStyle/>
+          <a:p>
+            <a:pPr algn="ctr"/>
+            <a:endParaRPr lang="en-US"/>
+          </a:p>
+        </p:txBody>
+      </p:sp>
+      <p:sp>
+        <p:nvSpPr>
+          <p:cNvPr id="19" name="Arc 18"/>
+          <p:cNvSpPr/>
+          <p:nvPr/>
+        </p:nvSpPr>
+        <p:spPr>
+          <a:xfrm rot="2702454">
+            <a:off x="3169142" y="1325699"/>
+            <a:ext cx="968061" cy="959305"/>
+          </a:xfrm>
+          <a:prstGeom prst="arc">
+            <a:avLst/>
+          </a:prstGeom>
+          <a:ln w="57150">
+            <a:solidFill>
+              <a:schemeClr val="tx1"/>
+            </a:solidFill>
+          </a:ln>
+        </p:spPr>
+        <p:style>
+          <a:lnRef idx="1">
+            <a:schemeClr val="accent1"/>
+          </a:lnRef>
+          <a:fillRef idx="0">
+            <a:schemeClr val="accent1"/>
+          </a:fillRef>
+          <a:effectRef idx="0">
+            <a:schemeClr val="accent1"/>
+          </a:effectRef>
+          <a:fontRef idx="minor">
+            <a:schemeClr val="tx1"/>
+          </a:fontRef>
+        </p:style>
+        <p:txBody>
+          <a:bodyPr rtlCol="0" anchor="ctr"/>
+          <a:lstStyle/>
+          <a:p>
+            <a:pPr algn="ctr"/>
+            <a:endParaRPr lang="en-US"/>
+          </a:p>
+        </p:txBody>
+      </p:sp>
+      <p:sp>
+        <p:nvSpPr>
+          <p:cNvPr id="20" name="Arc 19"/>
+          <p:cNvSpPr/>
+          <p:nvPr/>
+        </p:nvSpPr>
+        <p:spPr>
+          <a:xfrm rot="2702454">
+            <a:off x="3040323" y="1173560"/>
+            <a:ext cx="1270418" cy="1267167"/>
+          </a:xfrm>
+          <a:prstGeom prst="arc">
+            <a:avLst/>
+          </a:prstGeom>
+          <a:ln w="57150">
+            <a:solidFill>
+              <a:schemeClr val="tx1"/>
+            </a:solidFill>
+          </a:ln>
+        </p:spPr>
+        <p:style>
+          <a:lnRef idx="1">
+            <a:schemeClr val="accent1"/>
+          </a:lnRef>
+          <a:fillRef idx="0">
+            <a:schemeClr val="accent1"/>
+          </a:fillRef>
+          <a:effectRef idx="0">
+            <a:schemeClr val="accent1"/>
+          </a:effectRef>
+          <a:fontRef idx="minor">
+            <a:schemeClr val="tx1"/>
+          </a:fontRef>
+        </p:style>
+        <p:txBody>
+          <a:bodyPr rtlCol="0" anchor="ctr"/>
+          <a:lstStyle/>
+          <a:p>
+            <a:pPr algn="ctr"/>
+            <a:endParaRPr lang="en-US"/>
+          </a:p>
+        </p:txBody>
+      </p:sp>
+      <p:sp>
+        <p:nvSpPr>
+          <p:cNvPr id="21" name="TextBox 20"/>
+          <p:cNvSpPr txBox="1"/>
+          <p:nvPr/>
+        </p:nvSpPr>
+        <p:spPr>
+          <a:xfrm>
+            <a:off x="3298532" y="2289864"/>
+            <a:ext cx="2045753" cy="523220"/>
+          </a:xfrm>
+          <a:prstGeom prst="rect">
+            <a:avLst/>
+          </a:prstGeom>
+          <a:noFill/>
+        </p:spPr>
+        <p:txBody>
+          <a:bodyPr wrap="none" rtlCol="0">
+            <a:spAutoFit/>
+          </a:bodyPr>
+          <a:lstStyle/>
+          <a:p>
+            <a:r>
+              <a:rPr lang="en-US" sz="2800" dirty="0" smtClean="0"/>
+              <a:t>144.390MHz</a:t>
+            </a:r>
+            <a:endParaRPr lang="en-US" sz="2800" dirty="0"/>
+          </a:p>
+        </p:txBody>
+      </p:sp>
+    </p:spTree>
+    <p:extLst>
+      <p:ext uri="{BB962C8B-B14F-4D97-AF65-F5344CB8AC3E}">
+        <p14:creationId xmlns:p14="http://schemas.microsoft.com/office/powerpoint/2010/main" val="2064230995"/>
       </p:ext>
     </p:extLst>
   </p:cSld>

</xml_diff>

<commit_message>
Adding two new block diagrams
</commit_message>
<xml_diff>
--- a/images/BlockDiagrams.pptx
+++ b/images/BlockDiagrams.pptx
@@ -6353,7 +6353,7 @@
         </p:blipFill>
         <p:spPr>
           <a:xfrm>
-            <a:off x="1978619" y="2720814"/>
+            <a:off x="1978619" y="818249"/>
             <a:ext cx="1261570" cy="1150131"/>
           </a:xfrm>
           <a:prstGeom prst="rect">
@@ -6369,8 +6369,8 @@
         </p:nvSpPr>
         <p:spPr>
           <a:xfrm>
-            <a:off x="1777270" y="2172496"/>
-            <a:ext cx="1670649" cy="2246769"/>
+            <a:off x="2042566" y="330876"/>
+            <a:ext cx="1140056" cy="2031325"/>
           </a:xfrm>
           <a:prstGeom prst="rect">
             <a:avLst/>
@@ -6385,29 +6385,37 @@
           <a:p>
             <a:pPr algn="ctr"/>
             <a:r>
-              <a:rPr lang="en-US" sz="2800" dirty="0" smtClean="0"/>
+              <a:rPr lang="en-US" dirty="0" smtClean="0"/>
               <a:t>Laptop</a:t>
             </a:r>
           </a:p>
           <a:p>
             <a:pPr algn="ctr"/>
-            <a:endParaRPr lang="en-US" sz="2800" dirty="0"/>
+            <a:endParaRPr lang="en-US" smtClean="0"/>
           </a:p>
           <a:p>
             <a:pPr algn="ctr"/>
-            <a:endParaRPr lang="en-US" sz="2800" dirty="0" smtClean="0"/>
+            <a:endParaRPr lang="en-US"/>
           </a:p>
           <a:p>
             <a:pPr algn="ctr"/>
-            <a:endParaRPr lang="en-US" sz="2800" dirty="0" smtClean="0"/>
+            <a:endParaRPr lang="en-US" dirty="0"/>
           </a:p>
           <a:p>
             <a:pPr algn="ctr"/>
-            <a:r>
-              <a:rPr lang="en-US" sz="2800" dirty="0" smtClean="0"/>
+            <a:endParaRPr lang="en-US" dirty="0" smtClean="0"/>
+          </a:p>
+          <a:p>
+            <a:pPr algn="ctr"/>
+            <a:endParaRPr lang="en-US" dirty="0" smtClean="0"/>
+          </a:p>
+          <a:p>
+            <a:pPr algn="ctr"/>
+            <a:r>
+              <a:rPr lang="en-US" dirty="0" smtClean="0"/>
               <a:t>Audio Out</a:t>
             </a:r>
-            <a:endParaRPr lang="en-US" sz="2800" dirty="0"/>
+            <a:endParaRPr lang="en-US" dirty="0"/>
           </a:p>
         </p:txBody>
       </p:sp>
@@ -6419,8 +6427,8 @@
         </p:nvSpPr>
         <p:spPr>
           <a:xfrm>
-            <a:off x="1770889" y="2138331"/>
-            <a:ext cx="1677031" cy="2242038"/>
+            <a:off x="1770889" y="304800"/>
+            <a:ext cx="1677031" cy="2018169"/>
           </a:xfrm>
           <a:prstGeom prst="rect">
             <a:avLst/>
@@ -6465,8 +6473,8 @@
         </p:nvSpPr>
         <p:spPr>
           <a:xfrm>
-            <a:off x="5638800" y="2133600"/>
-            <a:ext cx="1402948" cy="2246769"/>
+            <a:off x="5856007" y="304801"/>
+            <a:ext cx="968535" cy="2031325"/>
           </a:xfrm>
           <a:prstGeom prst="rect">
             <a:avLst/>
@@ -6481,32 +6489,40 @@
           <a:p>
             <a:pPr algn="ctr"/>
             <a:r>
-              <a:rPr lang="en-US" sz="2800" dirty="0" smtClean="0"/>
+              <a:rPr lang="en-US" dirty="0" smtClean="0"/>
               <a:t>TNC / </a:t>
             </a:r>
           </a:p>
           <a:p>
             <a:pPr algn="ctr"/>
             <a:r>
-              <a:rPr lang="en-US" sz="2800" dirty="0" smtClean="0"/>
+              <a:rPr lang="en-US" dirty="0" smtClean="0"/>
               <a:t>Tracker</a:t>
             </a:r>
           </a:p>
           <a:p>
             <a:pPr algn="ctr"/>
-            <a:endParaRPr lang="en-US" sz="2800" dirty="0" smtClean="0"/>
+            <a:endParaRPr lang="en-US" smtClean="0"/>
           </a:p>
           <a:p>
             <a:pPr algn="ctr"/>
-            <a:endParaRPr lang="en-US" sz="2800" dirty="0" smtClean="0"/>
+            <a:endParaRPr lang="en-US"/>
           </a:p>
           <a:p>
             <a:pPr algn="ctr"/>
-            <a:r>
-              <a:rPr lang="en-US" sz="2800" dirty="0" smtClean="0"/>
+            <a:endParaRPr lang="en-US" dirty="0" smtClean="0"/>
+          </a:p>
+          <a:p>
+            <a:pPr algn="ctr"/>
+            <a:endParaRPr lang="en-US" dirty="0" smtClean="0"/>
+          </a:p>
+          <a:p>
+            <a:pPr algn="ctr"/>
+            <a:r>
+              <a:rPr lang="en-US" dirty="0" smtClean="0"/>
               <a:t>Audio In</a:t>
             </a:r>
-            <a:endParaRPr lang="en-US" sz="2800" dirty="0"/>
+            <a:endParaRPr lang="en-US" dirty="0"/>
           </a:p>
         </p:txBody>
       </p:sp>
@@ -6518,8 +6534,8 @@
         </p:nvSpPr>
         <p:spPr>
           <a:xfrm>
-            <a:off x="5501759" y="2099435"/>
-            <a:ext cx="1677031" cy="2242038"/>
+            <a:off x="5501759" y="304800"/>
+            <a:ext cx="1677031" cy="1979274"/>
           </a:xfrm>
           <a:prstGeom prst="rect">
             <a:avLst/>
@@ -6564,7 +6580,7 @@
         </p:nvCxnSpPr>
         <p:spPr>
           <a:xfrm>
-            <a:off x="3454300" y="4178146"/>
+            <a:off x="3454300" y="2120747"/>
             <a:ext cx="2047458" cy="1863"/>
           </a:xfrm>
           <a:prstGeom prst="line">
@@ -6625,8 +6641,8 @@
         </p:nvSpPr>
         <p:spPr>
           <a:xfrm flipV="1">
-            <a:off x="2417875" y="1805354"/>
-            <a:ext cx="1362807" cy="835270"/>
+            <a:off x="2736365" y="573040"/>
+            <a:ext cx="1159157" cy="590480"/>
           </a:xfrm>
           <a:prstGeom prst="triangle">
             <a:avLst/>
@@ -6661,7 +6677,7 @@
           <a:lstStyle/>
           <a:p>
             <a:pPr algn="ctr"/>
-            <a:endParaRPr lang="en-US" sz="2800"/>
+            <a:endParaRPr lang="en-US"/>
           </a:p>
         </p:txBody>
       </p:sp>
@@ -6670,13 +6686,14 @@
           <p:cNvPr id="5" name="Straight Connector 4"/>
           <p:cNvCxnSpPr>
             <a:stCxn id="4" idx="3"/>
+            <a:endCxn id="8" idx="0"/>
           </p:cNvCxnSpPr>
           <p:nvPr/>
         </p:nvCxnSpPr>
         <p:spPr>
-          <a:xfrm>
-            <a:off x="3099279" y="1805354"/>
-            <a:ext cx="4396" cy="2004646"/>
+          <a:xfrm flipH="1">
+            <a:off x="3309327" y="573040"/>
+            <a:ext cx="6617" cy="1391289"/>
           </a:xfrm>
           <a:prstGeom prst="line">
             <a:avLst/>
@@ -6700,16 +6717,16 @@
       </p:cxnSp>
       <p:sp>
         <p:nvSpPr>
-          <p:cNvPr id="6" name="Isosceles Triangle 5"/>
+          <p:cNvPr id="8" name="Rectangle 7"/>
           <p:cNvSpPr/>
           <p:nvPr/>
         </p:nvSpPr>
         <p:spPr>
-          <a:xfrm flipV="1">
-            <a:off x="5269523" y="1805354"/>
-            <a:ext cx="1362807" cy="835270"/>
-          </a:xfrm>
-          <a:prstGeom prst="triangle">
+          <a:xfrm>
+            <a:off x="2583965" y="1964329"/>
+            <a:ext cx="1450723" cy="592016"/>
+          </a:xfrm>
+          <a:prstGeom prst="rect">
             <a:avLst/>
           </a:prstGeom>
           <a:solidFill>
@@ -6742,53 +6759,32 @@
           <a:lstStyle/>
           <a:p>
             <a:pPr algn="ctr"/>
-            <a:endParaRPr lang="en-US" sz="2800"/>
-          </a:p>
-        </p:txBody>
-      </p:sp>
-      <p:cxnSp>
-        <p:nvCxnSpPr>
-          <p:cNvPr id="7" name="Straight Connector 6"/>
-          <p:cNvCxnSpPr>
-            <a:stCxn id="6" idx="3"/>
-          </p:cNvCxnSpPr>
-          <p:nvPr/>
-        </p:nvCxnSpPr>
-        <p:spPr>
-          <a:xfrm>
-            <a:off x="5950927" y="1805354"/>
-            <a:ext cx="4396" cy="2004646"/>
-          </a:xfrm>
-          <a:prstGeom prst="line">
-            <a:avLst/>
-          </a:prstGeom>
-          <a:ln w="57150"/>
-        </p:spPr>
-        <p:style>
-          <a:lnRef idx="1">
-            <a:schemeClr val="dk1"/>
-          </a:lnRef>
-          <a:fillRef idx="0">
-            <a:schemeClr val="dk1"/>
-          </a:fillRef>
-          <a:effectRef idx="0">
-            <a:schemeClr val="dk1"/>
-          </a:effectRef>
-          <a:fontRef idx="minor">
-            <a:schemeClr val="tx1"/>
-          </a:fontRef>
-        </p:style>
-      </p:cxnSp>
-      <p:sp>
-        <p:nvSpPr>
-          <p:cNvPr id="8" name="Rectangle 7"/>
+            <a:r>
+              <a:rPr lang="en-US" dirty="0" smtClean="0">
+                <a:solidFill>
+                  <a:schemeClr val="tx1"/>
+                </a:solidFill>
+              </a:rPr>
+              <a:t>TX Radio</a:t>
+            </a:r>
+            <a:endParaRPr lang="en-US" dirty="0">
+              <a:solidFill>
+                <a:schemeClr val="tx1"/>
+              </a:solidFill>
+            </a:endParaRPr>
+          </a:p>
+        </p:txBody>
+      </p:sp>
+      <p:sp>
+        <p:nvSpPr>
+          <p:cNvPr id="10" name="Rectangle 9"/>
           <p:cNvSpPr/>
           <p:nvPr/>
         </p:nvSpPr>
         <p:spPr>
           <a:xfrm>
-            <a:off x="2083769" y="3810000"/>
-            <a:ext cx="1652954" cy="896816"/>
+            <a:off x="907564" y="1964329"/>
+            <a:ext cx="1306380" cy="592016"/>
           </a:xfrm>
           <a:prstGeom prst="rect">
             <a:avLst/>
@@ -6824,14 +6820,14 @@
           <a:p>
             <a:pPr algn="ctr"/>
             <a:r>
-              <a:rPr lang="en-US" sz="2800" dirty="0" smtClean="0">
+              <a:rPr lang="en-US" dirty="0" smtClean="0">
                 <a:solidFill>
                   <a:schemeClr val="tx1"/>
                 </a:solidFill>
               </a:rPr>
-              <a:t>TX Radio</a:t>
-            </a:r>
-            <a:endParaRPr lang="en-US" sz="2800" dirty="0">
+              <a:t>APRS Tracker</a:t>
+            </a:r>
+            <a:endParaRPr lang="en-US" dirty="0">
               <a:solidFill>
                 <a:schemeClr val="tx1"/>
               </a:solidFill>
@@ -6841,14 +6837,14 @@
       </p:sp>
       <p:sp>
         <p:nvSpPr>
-          <p:cNvPr id="9" name="Rectangle 8"/>
+          <p:cNvPr id="11" name="Rectangle 10"/>
           <p:cNvSpPr/>
           <p:nvPr/>
         </p:nvSpPr>
         <p:spPr>
           <a:xfrm>
-            <a:off x="5410200" y="3810000"/>
-            <a:ext cx="1652954" cy="896816"/>
+            <a:off x="907565" y="1017689"/>
+            <a:ext cx="1315905" cy="565640"/>
           </a:xfrm>
           <a:prstGeom prst="rect">
             <a:avLst/>
@@ -6884,135 +6880,7 @@
           <a:p>
             <a:pPr algn="ctr"/>
             <a:r>
-              <a:rPr lang="en-US" sz="2800" dirty="0">
-                <a:solidFill>
-                  <a:schemeClr val="tx1"/>
-                </a:solidFill>
-              </a:rPr>
-              <a:t>R</a:t>
-            </a:r>
-            <a:r>
-              <a:rPr lang="en-US" sz="2800" dirty="0" smtClean="0">
-                <a:solidFill>
-                  <a:schemeClr val="tx1"/>
-                </a:solidFill>
-              </a:rPr>
-              <a:t>X Radio</a:t>
-            </a:r>
-            <a:endParaRPr lang="en-US" sz="2800" dirty="0">
-              <a:solidFill>
-                <a:schemeClr val="tx1"/>
-              </a:solidFill>
-            </a:endParaRPr>
-          </a:p>
-        </p:txBody>
-      </p:sp>
-      <p:sp>
-        <p:nvSpPr>
-          <p:cNvPr id="10" name="Rectangle 9"/>
-          <p:cNvSpPr/>
-          <p:nvPr/>
-        </p:nvSpPr>
-        <p:spPr>
-          <a:xfrm>
-            <a:off x="110625" y="3810000"/>
-            <a:ext cx="1652954" cy="896816"/>
-          </a:xfrm>
-          <a:prstGeom prst="rect">
-            <a:avLst/>
-          </a:prstGeom>
-          <a:solidFill>
-            <a:schemeClr val="bg1"/>
-          </a:solidFill>
-          <a:ln w="57150">
-            <a:solidFill>
-              <a:schemeClr val="tx1"/>
-            </a:solidFill>
-          </a:ln>
-        </p:spPr>
-        <p:style>
-          <a:lnRef idx="2">
-            <a:schemeClr val="accent1">
-              <a:shade val="50000"/>
-            </a:schemeClr>
-          </a:lnRef>
-          <a:fillRef idx="1">
-            <a:schemeClr val="accent1"/>
-          </a:fillRef>
-          <a:effectRef idx="0">
-            <a:schemeClr val="accent1"/>
-          </a:effectRef>
-          <a:fontRef idx="minor">
-            <a:schemeClr val="lt1"/>
-          </a:fontRef>
-        </p:style>
-        <p:txBody>
-          <a:bodyPr rtlCol="0" anchor="ctr"/>
-          <a:lstStyle/>
-          <a:p>
-            <a:pPr algn="ctr"/>
-            <a:r>
-              <a:rPr lang="en-US" sz="2800" dirty="0" smtClean="0">
-                <a:solidFill>
-                  <a:schemeClr val="tx1"/>
-                </a:solidFill>
-              </a:rPr>
-              <a:t>APRS Tracker</a:t>
-            </a:r>
-            <a:endParaRPr lang="en-US" sz="2800" dirty="0">
-              <a:solidFill>
-                <a:schemeClr val="tx1"/>
-              </a:solidFill>
-            </a:endParaRPr>
-          </a:p>
-        </p:txBody>
-      </p:sp>
-      <p:sp>
-        <p:nvSpPr>
-          <p:cNvPr id="11" name="Rectangle 10"/>
-          <p:cNvSpPr/>
-          <p:nvPr/>
-        </p:nvSpPr>
-        <p:spPr>
-          <a:xfrm>
-            <a:off x="120151" y="2640624"/>
-            <a:ext cx="1652954" cy="896816"/>
-          </a:xfrm>
-          <a:prstGeom prst="rect">
-            <a:avLst/>
-          </a:prstGeom>
-          <a:solidFill>
-            <a:schemeClr val="bg1"/>
-          </a:solidFill>
-          <a:ln w="57150">
-            <a:solidFill>
-              <a:schemeClr val="tx1"/>
-            </a:solidFill>
-          </a:ln>
-        </p:spPr>
-        <p:style>
-          <a:lnRef idx="2">
-            <a:schemeClr val="accent1">
-              <a:shade val="50000"/>
-            </a:schemeClr>
-          </a:lnRef>
-          <a:fillRef idx="1">
-            <a:schemeClr val="accent1"/>
-          </a:fillRef>
-          <a:effectRef idx="0">
-            <a:schemeClr val="accent1"/>
-          </a:effectRef>
-          <a:fontRef idx="minor">
-            <a:schemeClr val="lt1"/>
-          </a:fontRef>
-        </p:style>
-        <p:txBody>
-          <a:bodyPr rtlCol="0" anchor="ctr"/>
-          <a:lstStyle/>
-          <a:p>
-            <a:pPr algn="ctr"/>
-            <a:r>
-              <a:rPr lang="en-US" sz="2800" dirty="0" smtClean="0">
+              <a:rPr lang="en-US" dirty="0" smtClean="0">
                 <a:solidFill>
                   <a:schemeClr val="tx1"/>
                 </a:solidFill>
@@ -7033,8 +6901,8 @@
         </p:nvCxnSpPr>
         <p:spPr>
           <a:xfrm>
-            <a:off x="1763579" y="4258408"/>
-            <a:ext cx="320190" cy="0"/>
+            <a:off x="2213944" y="2260337"/>
+            <a:ext cx="370021" cy="0"/>
           </a:xfrm>
           <a:prstGeom prst="line">
             <a:avLst/>
@@ -7060,14 +6928,15 @@
         <p:nvCxnSpPr>
           <p:cNvPr id="13" name="Straight Connector 12"/>
           <p:cNvCxnSpPr>
+            <a:stCxn id="11" idx="2"/>
             <a:endCxn id="10" idx="0"/>
           </p:cNvCxnSpPr>
           <p:nvPr/>
         </p:nvCxnSpPr>
         <p:spPr>
-          <a:xfrm>
-            <a:off x="929043" y="3537440"/>
-            <a:ext cx="8059" cy="272560"/>
+          <a:xfrm flipH="1">
+            <a:off x="1560754" y="1583329"/>
+            <a:ext cx="4764" cy="381000"/>
           </a:xfrm>
           <a:prstGeom prst="line">
             <a:avLst/>
@@ -7091,198 +6960,13 @@
       </p:cxnSp>
       <p:sp>
         <p:nvSpPr>
-          <p:cNvPr id="14" name="Rectangle 13"/>
-          <p:cNvSpPr/>
-          <p:nvPr/>
-        </p:nvSpPr>
-        <p:spPr>
-          <a:xfrm>
-            <a:off x="7338645" y="3818792"/>
-            <a:ext cx="1652954" cy="896816"/>
-          </a:xfrm>
-          <a:prstGeom prst="rect">
-            <a:avLst/>
-          </a:prstGeom>
-          <a:solidFill>
-            <a:schemeClr val="bg1"/>
-          </a:solidFill>
-          <a:ln w="57150">
-            <a:solidFill>
-              <a:schemeClr val="tx1"/>
-            </a:solidFill>
-          </a:ln>
-        </p:spPr>
-        <p:style>
-          <a:lnRef idx="2">
-            <a:schemeClr val="accent1">
-              <a:shade val="50000"/>
-            </a:schemeClr>
-          </a:lnRef>
-          <a:fillRef idx="1">
-            <a:schemeClr val="accent1"/>
-          </a:fillRef>
-          <a:effectRef idx="0">
-            <a:schemeClr val="accent1"/>
-          </a:effectRef>
-          <a:fontRef idx="minor">
-            <a:schemeClr val="lt1"/>
-          </a:fontRef>
-        </p:style>
-        <p:txBody>
-          <a:bodyPr rtlCol="0" anchor="ctr"/>
-          <a:lstStyle/>
-          <a:p>
-            <a:pPr algn="ctr"/>
-            <a:r>
-              <a:rPr lang="en-US" sz="2800" dirty="0" smtClean="0">
-                <a:solidFill>
-                  <a:schemeClr val="tx1"/>
-                </a:solidFill>
-              </a:rPr>
-              <a:t>TNC</a:t>
-            </a:r>
-            <a:endParaRPr lang="en-US" sz="2800" dirty="0">
-              <a:solidFill>
-                <a:schemeClr val="tx1"/>
-              </a:solidFill>
-            </a:endParaRPr>
-          </a:p>
-        </p:txBody>
-      </p:sp>
-      <p:sp>
-        <p:nvSpPr>
-          <p:cNvPr id="15" name="Rectangle 14"/>
-          <p:cNvSpPr/>
-          <p:nvPr/>
-        </p:nvSpPr>
-        <p:spPr>
-          <a:xfrm>
-            <a:off x="7360626" y="2640624"/>
-            <a:ext cx="1652954" cy="896816"/>
-          </a:xfrm>
-          <a:prstGeom prst="rect">
-            <a:avLst/>
-          </a:prstGeom>
-          <a:solidFill>
-            <a:schemeClr val="bg1"/>
-          </a:solidFill>
-          <a:ln w="57150">
-            <a:solidFill>
-              <a:schemeClr val="tx1"/>
-            </a:solidFill>
-          </a:ln>
-        </p:spPr>
-        <p:style>
-          <a:lnRef idx="2">
-            <a:schemeClr val="accent1">
-              <a:shade val="50000"/>
-            </a:schemeClr>
-          </a:lnRef>
-          <a:fillRef idx="1">
-            <a:schemeClr val="accent1"/>
-          </a:fillRef>
-          <a:effectRef idx="0">
-            <a:schemeClr val="accent1"/>
-          </a:effectRef>
-          <a:fontRef idx="minor">
-            <a:schemeClr val="lt1"/>
-          </a:fontRef>
-        </p:style>
-        <p:txBody>
-          <a:bodyPr rtlCol="0" anchor="ctr"/>
-          <a:lstStyle/>
-          <a:p>
-            <a:pPr algn="ctr"/>
-            <a:r>
-              <a:rPr lang="en-US" sz="2800" dirty="0" smtClean="0">
-                <a:solidFill>
-                  <a:schemeClr val="tx1"/>
-                </a:solidFill>
-              </a:rPr>
-              <a:t>Computer</a:t>
-            </a:r>
-            <a:endParaRPr lang="en-US" sz="2800" dirty="0">
-              <a:solidFill>
-                <a:schemeClr val="tx1"/>
-              </a:solidFill>
-            </a:endParaRPr>
-          </a:p>
-        </p:txBody>
-      </p:sp>
-      <p:cxnSp>
-        <p:nvCxnSpPr>
-          <p:cNvPr id="16" name="Straight Connector 15"/>
-          <p:cNvCxnSpPr>
-            <a:stCxn id="9" idx="3"/>
-            <a:endCxn id="14" idx="1"/>
-          </p:cNvCxnSpPr>
-          <p:nvPr/>
-        </p:nvCxnSpPr>
-        <p:spPr>
-          <a:xfrm>
-            <a:off x="7063154" y="4258408"/>
-            <a:ext cx="275491" cy="8792"/>
-          </a:xfrm>
-          <a:prstGeom prst="line">
-            <a:avLst/>
-          </a:prstGeom>
-          <a:ln w="57150"/>
-        </p:spPr>
-        <p:style>
-          <a:lnRef idx="1">
-            <a:schemeClr val="dk1"/>
-          </a:lnRef>
-          <a:fillRef idx="0">
-            <a:schemeClr val="dk1"/>
-          </a:fillRef>
-          <a:effectRef idx="0">
-            <a:schemeClr val="dk1"/>
-          </a:effectRef>
-          <a:fontRef idx="minor">
-            <a:schemeClr val="tx1"/>
-          </a:fontRef>
-        </p:style>
-      </p:cxnSp>
-      <p:cxnSp>
-        <p:nvCxnSpPr>
-          <p:cNvPr id="17" name="Straight Connector 16"/>
-          <p:cNvCxnSpPr/>
-          <p:nvPr/>
-        </p:nvCxnSpPr>
-        <p:spPr>
-          <a:xfrm>
-            <a:off x="8187103" y="3511062"/>
-            <a:ext cx="8059" cy="272560"/>
-          </a:xfrm>
-          <a:prstGeom prst="line">
-            <a:avLst/>
-          </a:prstGeom>
-          <a:ln w="57150"/>
-        </p:spPr>
-        <p:style>
-          <a:lnRef idx="1">
-            <a:schemeClr val="dk1"/>
-          </a:lnRef>
-          <a:fillRef idx="0">
-            <a:schemeClr val="dk1"/>
-          </a:fillRef>
-          <a:effectRef idx="0">
-            <a:schemeClr val="dk1"/>
-          </a:effectRef>
-          <a:fontRef idx="minor">
-            <a:schemeClr val="tx1"/>
-          </a:fontRef>
-        </p:style>
-      </p:cxnSp>
-      <p:sp>
-        <p:nvSpPr>
           <p:cNvPr id="18" name="Arc 17"/>
           <p:cNvSpPr/>
           <p:nvPr/>
         </p:nvSpPr>
         <p:spPr>
           <a:xfrm rot="2702454">
-            <a:off x="3345994" y="1511745"/>
+            <a:off x="3504800" y="314558"/>
             <a:ext cx="623193" cy="587215"/>
           </a:xfrm>
           <a:prstGeom prst="arc">
@@ -7325,7 +7009,7 @@
         </p:nvSpPr>
         <p:spPr>
           <a:xfrm rot="2702454">
-            <a:off x="3169142" y="1325699"/>
+            <a:off x="3327948" y="128512"/>
             <a:ext cx="968061" cy="959305"/>
           </a:xfrm>
           <a:prstGeom prst="arc">
@@ -7368,7 +7052,7 @@
         </p:nvSpPr>
         <p:spPr>
           <a:xfrm rot="2702454">
-            <a:off x="3040323" y="1173560"/>
+            <a:off x="3199129" y="-41211"/>
             <a:ext cx="1270418" cy="1267167"/>
           </a:xfrm>
           <a:prstGeom prst="arc">
@@ -7411,8 +7095,8 @@
         </p:nvSpPr>
         <p:spPr>
           <a:xfrm>
-            <a:off x="3298532" y="2289864"/>
-            <a:ext cx="2045753" cy="523220"/>
+            <a:off x="3457338" y="1092677"/>
+            <a:ext cx="1377300" cy="369332"/>
           </a:xfrm>
           <a:prstGeom prst="rect">
             <a:avLst/>
@@ -7426,13 +7110,374 @@
           <a:lstStyle/>
           <a:p>
             <a:r>
-              <a:rPr lang="en-US" sz="2800" dirty="0" smtClean="0"/>
+              <a:rPr lang="en-US" dirty="0" smtClean="0"/>
               <a:t>144.390MHz</a:t>
             </a:r>
-            <a:endParaRPr lang="en-US" sz="2800" dirty="0"/>
-          </a:p>
-        </p:txBody>
-      </p:sp>
+            <a:endParaRPr lang="en-US" dirty="0"/>
+          </a:p>
+        </p:txBody>
+      </p:sp>
+      <p:grpSp>
+        <p:nvGrpSpPr>
+          <p:cNvPr id="41" name="Group 40"/>
+          <p:cNvGrpSpPr/>
+          <p:nvPr/>
+        </p:nvGrpSpPr>
+        <p:grpSpPr>
+          <a:xfrm flipH="1">
+            <a:off x="4797676" y="573040"/>
+            <a:ext cx="3127124" cy="1983305"/>
+            <a:chOff x="425724" y="3523098"/>
+            <a:chExt cx="3127124" cy="1983305"/>
+          </a:xfrm>
+        </p:grpSpPr>
+        <p:sp>
+          <p:nvSpPr>
+            <p:cNvPr id="32" name="Isosceles Triangle 31"/>
+            <p:cNvSpPr/>
+            <p:nvPr/>
+          </p:nvSpPr>
+          <p:spPr>
+            <a:xfrm flipV="1">
+              <a:off x="2254525" y="3523098"/>
+              <a:ext cx="1159157" cy="590480"/>
+            </a:xfrm>
+            <a:prstGeom prst="triangle">
+              <a:avLst/>
+            </a:prstGeom>
+            <a:solidFill>
+              <a:schemeClr val="bg1"/>
+            </a:solidFill>
+            <a:ln w="57150">
+              <a:solidFill>
+                <a:schemeClr val="tx1"/>
+              </a:solidFill>
+            </a:ln>
+          </p:spPr>
+          <p:style>
+            <a:lnRef idx="2">
+              <a:schemeClr val="accent1">
+                <a:shade val="50000"/>
+              </a:schemeClr>
+            </a:lnRef>
+            <a:fillRef idx="1">
+              <a:schemeClr val="accent1"/>
+            </a:fillRef>
+            <a:effectRef idx="0">
+              <a:schemeClr val="accent1"/>
+            </a:effectRef>
+            <a:fontRef idx="minor">
+              <a:schemeClr val="lt1"/>
+            </a:fontRef>
+          </p:style>
+          <p:txBody>
+            <a:bodyPr rtlCol="0" anchor="ctr"/>
+            <a:lstStyle/>
+            <a:p>
+              <a:pPr algn="ctr"/>
+              <a:endParaRPr lang="en-US"/>
+            </a:p>
+          </p:txBody>
+        </p:sp>
+        <p:cxnSp>
+          <p:nvCxnSpPr>
+            <p:cNvPr id="33" name="Straight Connector 32"/>
+            <p:cNvCxnSpPr>
+              <a:stCxn id="32" idx="3"/>
+              <a:endCxn id="34" idx="0"/>
+            </p:cNvCxnSpPr>
+            <p:nvPr/>
+          </p:nvCxnSpPr>
+          <p:spPr>
+            <a:xfrm flipH="1">
+              <a:off x="2827487" y="3523098"/>
+              <a:ext cx="6617" cy="1391289"/>
+            </a:xfrm>
+            <a:prstGeom prst="line">
+              <a:avLst/>
+            </a:prstGeom>
+            <a:ln w="57150"/>
+          </p:spPr>
+          <p:style>
+            <a:lnRef idx="1">
+              <a:schemeClr val="dk1"/>
+            </a:lnRef>
+            <a:fillRef idx="0">
+              <a:schemeClr val="dk1"/>
+            </a:fillRef>
+            <a:effectRef idx="0">
+              <a:schemeClr val="dk1"/>
+            </a:effectRef>
+            <a:fontRef idx="minor">
+              <a:schemeClr val="tx1"/>
+            </a:fontRef>
+          </p:style>
+        </p:cxnSp>
+        <p:sp>
+          <p:nvSpPr>
+            <p:cNvPr id="34" name="Rectangle 33"/>
+            <p:cNvSpPr/>
+            <p:nvPr/>
+          </p:nvSpPr>
+          <p:spPr>
+            <a:xfrm>
+              <a:off x="2102125" y="4914387"/>
+              <a:ext cx="1450723" cy="592016"/>
+            </a:xfrm>
+            <a:prstGeom prst="rect">
+              <a:avLst/>
+            </a:prstGeom>
+            <a:solidFill>
+              <a:schemeClr val="bg1"/>
+            </a:solidFill>
+            <a:ln w="57150">
+              <a:solidFill>
+                <a:schemeClr val="tx1"/>
+              </a:solidFill>
+            </a:ln>
+          </p:spPr>
+          <p:style>
+            <a:lnRef idx="2">
+              <a:schemeClr val="accent1">
+                <a:shade val="50000"/>
+              </a:schemeClr>
+            </a:lnRef>
+            <a:fillRef idx="1">
+              <a:schemeClr val="accent1"/>
+            </a:fillRef>
+            <a:effectRef idx="0">
+              <a:schemeClr val="accent1"/>
+            </a:effectRef>
+            <a:fontRef idx="minor">
+              <a:schemeClr val="lt1"/>
+            </a:fontRef>
+          </p:style>
+          <p:txBody>
+            <a:bodyPr rtlCol="0" anchor="ctr"/>
+            <a:lstStyle/>
+            <a:p>
+              <a:pPr algn="ctr"/>
+              <a:r>
+                <a:rPr lang="en-US" dirty="0">
+                  <a:solidFill>
+                    <a:schemeClr val="tx1"/>
+                  </a:solidFill>
+                </a:rPr>
+                <a:t>R</a:t>
+              </a:r>
+              <a:r>
+                <a:rPr lang="en-US" smtClean="0">
+                  <a:solidFill>
+                    <a:schemeClr val="tx1"/>
+                  </a:solidFill>
+                </a:rPr>
+                <a:t>X </a:t>
+              </a:r>
+              <a:r>
+                <a:rPr lang="en-US" dirty="0" smtClean="0">
+                  <a:solidFill>
+                    <a:schemeClr val="tx1"/>
+                  </a:solidFill>
+                </a:rPr>
+                <a:t>Radio</a:t>
+              </a:r>
+              <a:endParaRPr lang="en-US" dirty="0">
+                <a:solidFill>
+                  <a:schemeClr val="tx1"/>
+                </a:solidFill>
+              </a:endParaRPr>
+            </a:p>
+          </p:txBody>
+        </p:sp>
+        <p:sp>
+          <p:nvSpPr>
+            <p:cNvPr id="35" name="Rectangle 34"/>
+            <p:cNvSpPr/>
+            <p:nvPr/>
+          </p:nvSpPr>
+          <p:spPr>
+            <a:xfrm>
+              <a:off x="425724" y="4914387"/>
+              <a:ext cx="1306380" cy="592016"/>
+            </a:xfrm>
+            <a:prstGeom prst="rect">
+              <a:avLst/>
+            </a:prstGeom>
+            <a:solidFill>
+              <a:schemeClr val="bg1"/>
+            </a:solidFill>
+            <a:ln w="57150">
+              <a:solidFill>
+                <a:schemeClr val="tx1"/>
+              </a:solidFill>
+            </a:ln>
+          </p:spPr>
+          <p:style>
+            <a:lnRef idx="2">
+              <a:schemeClr val="accent1">
+                <a:shade val="50000"/>
+              </a:schemeClr>
+            </a:lnRef>
+            <a:fillRef idx="1">
+              <a:schemeClr val="accent1"/>
+            </a:fillRef>
+            <a:effectRef idx="0">
+              <a:schemeClr val="accent1"/>
+            </a:effectRef>
+            <a:fontRef idx="minor">
+              <a:schemeClr val="lt1"/>
+            </a:fontRef>
+          </p:style>
+          <p:txBody>
+            <a:bodyPr rtlCol="0" anchor="ctr"/>
+            <a:lstStyle/>
+            <a:p>
+              <a:pPr algn="ctr"/>
+              <a:r>
+                <a:rPr lang="en-US" smtClean="0">
+                  <a:solidFill>
+                    <a:schemeClr val="tx1"/>
+                  </a:solidFill>
+                </a:rPr>
+                <a:t>TNC</a:t>
+              </a:r>
+              <a:endParaRPr lang="en-US" dirty="0">
+                <a:solidFill>
+                  <a:schemeClr val="tx1"/>
+                </a:solidFill>
+              </a:endParaRPr>
+            </a:p>
+          </p:txBody>
+        </p:sp>
+        <p:sp>
+          <p:nvSpPr>
+            <p:cNvPr id="36" name="Rectangle 35"/>
+            <p:cNvSpPr/>
+            <p:nvPr/>
+          </p:nvSpPr>
+          <p:spPr>
+            <a:xfrm>
+              <a:off x="425725" y="3967747"/>
+              <a:ext cx="1315905" cy="565640"/>
+            </a:xfrm>
+            <a:prstGeom prst="rect">
+              <a:avLst/>
+            </a:prstGeom>
+            <a:solidFill>
+              <a:schemeClr val="bg1"/>
+            </a:solidFill>
+            <a:ln w="57150">
+              <a:solidFill>
+                <a:schemeClr val="tx1"/>
+              </a:solidFill>
+            </a:ln>
+          </p:spPr>
+          <p:style>
+            <a:lnRef idx="2">
+              <a:schemeClr val="accent1">
+                <a:shade val="50000"/>
+              </a:schemeClr>
+            </a:lnRef>
+            <a:fillRef idx="1">
+              <a:schemeClr val="accent1"/>
+            </a:fillRef>
+            <a:effectRef idx="0">
+              <a:schemeClr val="accent1"/>
+            </a:effectRef>
+            <a:fontRef idx="minor">
+              <a:schemeClr val="lt1"/>
+            </a:fontRef>
+          </p:style>
+          <p:txBody>
+            <a:bodyPr rtlCol="0" anchor="ctr"/>
+            <a:lstStyle/>
+            <a:p>
+              <a:pPr algn="ctr"/>
+              <a:r>
+                <a:rPr lang="en-US" smtClean="0">
+                  <a:solidFill>
+                    <a:schemeClr val="tx1"/>
+                  </a:solidFill>
+                </a:rPr>
+                <a:t>Computer</a:t>
+              </a:r>
+              <a:endParaRPr lang="en-US" dirty="0" smtClean="0">
+                <a:solidFill>
+                  <a:schemeClr val="tx1"/>
+                </a:solidFill>
+              </a:endParaRPr>
+            </a:p>
+          </p:txBody>
+        </p:sp>
+        <p:cxnSp>
+          <p:nvCxnSpPr>
+            <p:cNvPr id="37" name="Straight Connector 36"/>
+            <p:cNvCxnSpPr>
+              <a:stCxn id="35" idx="3"/>
+              <a:endCxn id="34" idx="1"/>
+            </p:cNvCxnSpPr>
+            <p:nvPr/>
+          </p:nvCxnSpPr>
+          <p:spPr>
+            <a:xfrm>
+              <a:off x="1732104" y="5210395"/>
+              <a:ext cx="370021" cy="0"/>
+            </a:xfrm>
+            <a:prstGeom prst="line">
+              <a:avLst/>
+            </a:prstGeom>
+            <a:ln w="57150"/>
+          </p:spPr>
+          <p:style>
+            <a:lnRef idx="1">
+              <a:schemeClr val="dk1"/>
+            </a:lnRef>
+            <a:fillRef idx="0">
+              <a:schemeClr val="dk1"/>
+            </a:fillRef>
+            <a:effectRef idx="0">
+              <a:schemeClr val="dk1"/>
+            </a:effectRef>
+            <a:fontRef idx="minor">
+              <a:schemeClr val="tx1"/>
+            </a:fontRef>
+          </p:style>
+        </p:cxnSp>
+        <p:cxnSp>
+          <p:nvCxnSpPr>
+            <p:cNvPr id="38" name="Straight Connector 37"/>
+            <p:cNvCxnSpPr>
+              <a:stCxn id="36" idx="2"/>
+              <a:endCxn id="35" idx="0"/>
+            </p:cNvCxnSpPr>
+            <p:nvPr/>
+          </p:nvCxnSpPr>
+          <p:spPr>
+            <a:xfrm flipH="1">
+              <a:off x="1078914" y="4533387"/>
+              <a:ext cx="4764" cy="381000"/>
+            </a:xfrm>
+            <a:prstGeom prst="line">
+              <a:avLst/>
+            </a:prstGeom>
+            <a:ln w="57150"/>
+          </p:spPr>
+          <p:style>
+            <a:lnRef idx="1">
+              <a:schemeClr val="dk1"/>
+            </a:lnRef>
+            <a:fillRef idx="0">
+              <a:schemeClr val="dk1"/>
+            </a:fillRef>
+            <a:effectRef idx="0">
+              <a:schemeClr val="dk1"/>
+            </a:effectRef>
+            <a:fontRef idx="minor">
+              <a:schemeClr val="tx1"/>
+            </a:fontRef>
+          </p:style>
+        </p:cxnSp>
+      </p:grpSp>
     </p:spTree>
     <p:extLst>
       <p:ext uri="{BB962C8B-B14F-4D97-AF65-F5344CB8AC3E}">

</xml_diff>